<commit_message>
Update PROJECT WORK PRESENTATION.pptx
</commit_message>
<xml_diff>
--- a/PROJECT WORK PRESENTATION.pptx
+++ b/PROJECT WORK PRESENTATION.pptx
@@ -11,10 +11,12 @@
     <p:sldId id="260" r:id="rId5"/>
     <p:sldId id="259" r:id="rId6"/>
     <p:sldId id="261" r:id="rId7"/>
-    <p:sldId id="262" r:id="rId8"/>
-    <p:sldId id="263" r:id="rId9"/>
-    <p:sldId id="264" r:id="rId10"/>
-    <p:sldId id="265" r:id="rId11"/>
+    <p:sldId id="266" r:id="rId8"/>
+    <p:sldId id="267" r:id="rId9"/>
+    <p:sldId id="265" r:id="rId10"/>
+    <p:sldId id="268" r:id="rId11"/>
+    <p:sldId id="269" r:id="rId12"/>
+    <p:sldId id="270" r:id="rId13"/>
   </p:sldIdLst>
   <p:sldSz cx="12192000" cy="6858000"/>
   <p:notesSz cx="6858000" cy="9144000"/>
@@ -124,10 +126,12 @@
             <p14:sldId id="260"/>
             <p14:sldId id="259"/>
             <p14:sldId id="261"/>
-            <p14:sldId id="262"/>
-            <p14:sldId id="263"/>
-            <p14:sldId id="264"/>
+            <p14:sldId id="266"/>
+            <p14:sldId id="267"/>
             <p14:sldId id="265"/>
+            <p14:sldId id="268"/>
+            <p14:sldId id="269"/>
+            <p14:sldId id="270"/>
           </p14:sldIdLst>
         </p14:section>
       </p14:sectionLst>
@@ -887,7 +891,7 @@
           <a:p>
             <a:fld id="{48A87A34-81AB-432B-8DAE-1953F412C126}" type="datetimeFigureOut">
               <a:rPr lang="en-US" smtClean="0"/>
-              <a:t>5/7/2022</a:t>
+              <a:t>5/11/2022</a:t>
             </a:fld>
             <a:endParaRPr lang="en-US" dirty="0"/>
           </a:p>
@@ -1139,7 +1143,7 @@
             <a:fld id="{48A87A34-81AB-432B-8DAE-1953F412C126}" type="datetimeFigureOut">
               <a:rPr lang="en-US" smtClean="0"/>
               <a:pPr/>
-              <a:t>5/7/2022</a:t>
+              <a:t>5/11/2022</a:t>
             </a:fld>
             <a:endParaRPr lang="en-US" dirty="0"/>
           </a:p>
@@ -1455,7 +1459,7 @@
             <a:fld id="{48A87A34-81AB-432B-8DAE-1953F412C126}" type="datetimeFigureOut">
               <a:rPr lang="en-US" smtClean="0"/>
               <a:pPr/>
-              <a:t>5/7/2022</a:t>
+              <a:t>5/11/2022</a:t>
             </a:fld>
             <a:endParaRPr lang="en-US" dirty="0"/>
           </a:p>
@@ -1798,7 +1802,7 @@
             <a:fld id="{48A87A34-81AB-432B-8DAE-1953F412C126}" type="datetimeFigureOut">
               <a:rPr lang="en-US" smtClean="0"/>
               <a:pPr/>
-              <a:t>5/7/2022</a:t>
+              <a:t>5/11/2022</a:t>
             </a:fld>
             <a:endParaRPr lang="en-US" dirty="0"/>
           </a:p>
@@ -2114,7 +2118,7 @@
             <a:fld id="{48A87A34-81AB-432B-8DAE-1953F412C126}" type="datetimeFigureOut">
               <a:rPr lang="en-US" smtClean="0"/>
               <a:pPr/>
-              <a:t>5/7/2022</a:t>
+              <a:t>5/11/2022</a:t>
             </a:fld>
             <a:endParaRPr lang="en-US" dirty="0"/>
           </a:p>
@@ -2509,7 +2513,7 @@
             <a:fld id="{48A87A34-81AB-432B-8DAE-1953F412C126}" type="datetimeFigureOut">
               <a:rPr lang="en-US" smtClean="0"/>
               <a:pPr/>
-              <a:t>5/7/2022</a:t>
+              <a:t>5/11/2022</a:t>
             </a:fld>
             <a:endParaRPr lang="en-US" dirty="0"/>
           </a:p>
@@ -2681,7 +2685,7 @@
             <a:fld id="{48A87A34-81AB-432B-8DAE-1953F412C126}" type="datetimeFigureOut">
               <a:rPr lang="en-US" smtClean="0"/>
               <a:pPr/>
-              <a:t>5/7/2022</a:t>
+              <a:t>5/11/2022</a:t>
             </a:fld>
             <a:endParaRPr lang="en-US" dirty="0"/>
           </a:p>
@@ -2863,7 +2867,7 @@
             <a:fld id="{48A87A34-81AB-432B-8DAE-1953F412C126}" type="datetimeFigureOut">
               <a:rPr lang="en-US" smtClean="0"/>
               <a:pPr/>
-              <a:t>5/7/2022</a:t>
+              <a:t>5/11/2022</a:t>
             </a:fld>
             <a:endParaRPr lang="en-US" dirty="0"/>
           </a:p>
@@ -3039,7 +3043,7 @@
           <a:p>
             <a:fld id="{48A87A34-81AB-432B-8DAE-1953F412C126}" type="datetimeFigureOut">
               <a:rPr lang="en-US" dirty="0"/>
-              <a:t>5/7/2022</a:t>
+              <a:t>5/11/2022</a:t>
             </a:fld>
             <a:endParaRPr lang="en-US" dirty="0"/>
           </a:p>
@@ -3216,7 +3220,7 @@
             <a:fld id="{48A87A34-81AB-432B-8DAE-1953F412C126}" type="datetimeFigureOut">
               <a:rPr lang="en-US" smtClean="0"/>
               <a:pPr/>
-              <a:t>5/7/2022</a:t>
+              <a:t>5/11/2022</a:t>
             </a:fld>
             <a:endParaRPr lang="en-US" dirty="0"/>
           </a:p>
@@ -3464,7 +3468,7 @@
           <a:p>
             <a:fld id="{48A87A34-81AB-432B-8DAE-1953F412C126}" type="datetimeFigureOut">
               <a:rPr lang="en-US" smtClean="0"/>
-              <a:t>5/7/2022</a:t>
+              <a:t>5/11/2022</a:t>
             </a:fld>
             <a:endParaRPr lang="en-US" dirty="0"/>
           </a:p>
@@ -3697,7 +3701,7 @@
             <a:fld id="{48A87A34-81AB-432B-8DAE-1953F412C126}" type="datetimeFigureOut">
               <a:rPr lang="en-US" smtClean="0"/>
               <a:pPr/>
-              <a:t>5/7/2022</a:t>
+              <a:t>5/11/2022</a:t>
             </a:fld>
             <a:endParaRPr lang="en-US" dirty="0"/>
           </a:p>
@@ -4073,7 +4077,7 @@
             <a:fld id="{48A87A34-81AB-432B-8DAE-1953F412C126}" type="datetimeFigureOut">
               <a:rPr lang="en-US" smtClean="0"/>
               <a:pPr/>
-              <a:t>5/7/2022</a:t>
+              <a:t>5/11/2022</a:t>
             </a:fld>
             <a:endParaRPr lang="en-US" dirty="0"/>
           </a:p>
@@ -4197,7 +4201,7 @@
           <a:p>
             <a:fld id="{48A87A34-81AB-432B-8DAE-1953F412C126}" type="datetimeFigureOut">
               <a:rPr lang="en-US" smtClean="0"/>
-              <a:t>5/7/2022</a:t>
+              <a:t>5/11/2022</a:t>
             </a:fld>
             <a:endParaRPr lang="en-US" dirty="0"/>
           </a:p>
@@ -4292,7 +4296,7 @@
           <a:p>
             <a:fld id="{48A87A34-81AB-432B-8DAE-1953F412C126}" type="datetimeFigureOut">
               <a:rPr lang="en-US" smtClean="0"/>
-              <a:t>5/7/2022</a:t>
+              <a:t>5/11/2022</a:t>
             </a:fld>
             <a:endParaRPr lang="en-US" dirty="0"/>
           </a:p>
@@ -4548,7 +4552,7 @@
             <a:fld id="{48A87A34-81AB-432B-8DAE-1953F412C126}" type="datetimeFigureOut">
               <a:rPr lang="en-US" smtClean="0"/>
               <a:pPr/>
-              <a:t>5/7/2022</a:t>
+              <a:t>5/11/2022</a:t>
             </a:fld>
             <a:endParaRPr lang="en-US" dirty="0"/>
           </a:p>
@@ -4812,7 +4816,7 @@
           <a:p>
             <a:fld id="{48A87A34-81AB-432B-8DAE-1953F412C126}" type="datetimeFigureOut">
               <a:rPr lang="en-US" smtClean="0"/>
-              <a:t>5/7/2022</a:t>
+              <a:t>5/11/2022</a:t>
             </a:fld>
             <a:endParaRPr lang="en-US" dirty="0"/>
           </a:p>
@@ -5556,7 +5560,7 @@
             <a:fld id="{48A87A34-81AB-432B-8DAE-1953F412C126}" type="datetimeFigureOut">
               <a:rPr lang="en-US" smtClean="0"/>
               <a:pPr/>
-              <a:t>5/7/2022</a:t>
+              <a:t>5/11/2022</a:t>
             </a:fld>
             <a:endParaRPr lang="en-US" dirty="0"/>
           </a:p>
@@ -6174,6 +6178,13 @@
               <a:rPr lang="en-US" dirty="0"/>
               <a:t>                    </a:t>
             </a:r>
+            <a:br>
+              <a:rPr lang="en-US" dirty="0"/>
+            </a:br>
+            <a:r>
+              <a:rPr lang="en-US" dirty="0"/>
+              <a:t>                     </a:t>
+            </a:r>
             <a:r>
               <a:rPr lang="en-US" sz="3200" b="1" dirty="0">
                 <a:solidFill>
@@ -6298,10 +6309,10 @@
       </p:grpSpPr>
       <p:sp>
         <p:nvSpPr>
-          <p:cNvPr id="7" name="Title 6">
+          <p:cNvPr id="4" name="Title 3">
             <a:extLst>
               <a:ext uri="{FF2B5EF4-FFF2-40B4-BE49-F238E27FC236}">
-                <a16:creationId xmlns:a16="http://schemas.microsoft.com/office/drawing/2014/main" id="{760879E2-9C3E-CB9E-9CD7-22010B4707A9}"/>
+                <a16:creationId xmlns:a16="http://schemas.microsoft.com/office/drawing/2014/main" id="{A1BEBF3A-B9E3-C49D-06B4-21B2BDEA1712}"/>
               </a:ext>
             </a:extLst>
           </p:cNvPr>
@@ -6312,227 +6323,180 @@
             <p:ph type="title"/>
           </p:nvPr>
         </p:nvSpPr>
-        <p:spPr/>
-        <p:txBody>
-          <a:bodyPr/>
+        <p:spPr>
+          <a:xfrm>
+            <a:off x="677334" y="230588"/>
+            <a:ext cx="8596668" cy="604299"/>
+          </a:xfrm>
+        </p:spPr>
+        <p:txBody>
+          <a:bodyPr>
+            <a:normAutofit fontScale="90000"/>
+          </a:bodyPr>
           <a:lstStyle/>
           <a:p>
             <a:r>
-              <a:rPr lang="en-IN" dirty="0"/>
-              <a:t>                 </a:t>
-            </a:r>
-            <a:r>
-              <a:rPr lang="en-IN" dirty="0">
-                <a:solidFill>
-                  <a:schemeClr val="accent4"/>
-                </a:solidFill>
-              </a:rPr>
-              <a:t>CONCLUSION</a:t>
-            </a:r>
-          </a:p>
-        </p:txBody>
-      </p:sp>
-      <p:sp>
-        <p:nvSpPr>
-          <p:cNvPr id="8" name="Content Placeholder 7">
+              <a:rPr lang="en-US" dirty="0"/>
+              <a:t>                       Project Snapshot</a:t>
+            </a:r>
+            <a:endParaRPr lang="en-IN" dirty="0"/>
+          </a:p>
+        </p:txBody>
+      </p:sp>
+      <p:pic>
+        <p:nvPicPr>
+          <p:cNvPr id="6" name="Picture 5">
             <a:extLst>
               <a:ext uri="{FF2B5EF4-FFF2-40B4-BE49-F238E27FC236}">
-                <a16:creationId xmlns:a16="http://schemas.microsoft.com/office/drawing/2014/main" id="{DBE1DDA2-209C-80CB-980F-486285E22E97}"/>
+                <a16:creationId xmlns:a16="http://schemas.microsoft.com/office/drawing/2014/main" id="{587C131A-094F-1E33-1A05-0F87C38B97A8}"/>
               </a:ext>
             </a:extLst>
           </p:cNvPr>
-          <p:cNvSpPr>
-            <a:spLocks noGrp="1"/>
-          </p:cNvSpPr>
-          <p:nvPr>
-            <p:ph idx="1"/>
-          </p:nvPr>
-        </p:nvSpPr>
+          <p:cNvPicPr>
+            <a:picLocks noChangeAspect="1"/>
+          </p:cNvPicPr>
+          <p:nvPr/>
+        </p:nvPicPr>
+        <p:blipFill>
+          <a:blip r:embed="rId2"/>
+          <a:stretch>
+            <a:fillRect/>
+          </a:stretch>
+        </p:blipFill>
         <p:spPr>
           <a:xfrm>
-            <a:off x="677334" y="1721797"/>
-            <a:ext cx="8596668" cy="4319566"/>
+            <a:off x="0" y="834887"/>
+            <a:ext cx="12192000" cy="5880238"/>
           </a:xfrm>
+          <a:prstGeom prst="rect">
+            <a:avLst/>
+          </a:prstGeom>
         </p:spPr>
-        <p:txBody>
-          <a:bodyPr>
-            <a:normAutofit fontScale="77500" lnSpcReduction="20000"/>
-          </a:bodyPr>
-          <a:lstStyle/>
-          <a:p>
-            <a:pPr algn="just">
-              <a:lnSpc>
-                <a:spcPct val="150000"/>
-              </a:lnSpc>
-              <a:spcAft>
-                <a:spcPts val="1000"/>
-              </a:spcAft>
-            </a:pPr>
-            <a:r>
-              <a:rPr lang="en-US" sz="1900" dirty="0">
-                <a:effectLst/>
-                <a:latin typeface="Times New Roman" panose="02020603050405020304" pitchFamily="18" charset="0"/>
-                <a:ea typeface="Times New Roman" panose="02020603050405020304" pitchFamily="18" charset="0"/>
-                <a:cs typeface="Times New Roman" panose="02020603050405020304" pitchFamily="18" charset="0"/>
-              </a:rPr>
-              <a:t> The project entitled as</a:t>
-            </a:r>
-            <a:r>
-              <a:rPr lang="en-US" sz="1900" b="1" dirty="0">
-                <a:effectLst/>
-                <a:latin typeface="Times New Roman" panose="02020603050405020304" pitchFamily="18" charset="0"/>
-                <a:ea typeface="Times New Roman" panose="02020603050405020304" pitchFamily="18" charset="0"/>
-                <a:cs typeface="Times New Roman" panose="02020603050405020304" pitchFamily="18" charset="0"/>
-              </a:rPr>
-              <a:t> College Management System</a:t>
-            </a:r>
-            <a:r>
-              <a:rPr lang="en-US" sz="1900" dirty="0">
-                <a:effectLst/>
-                <a:latin typeface="Times New Roman" panose="02020603050405020304" pitchFamily="18" charset="0"/>
-                <a:ea typeface="Times New Roman" panose="02020603050405020304" pitchFamily="18" charset="0"/>
-                <a:cs typeface="Times New Roman" panose="02020603050405020304" pitchFamily="18" charset="0"/>
-              </a:rPr>
-              <a:t> is the system that deals with the issues related to a particular institution.</a:t>
-            </a:r>
-          </a:p>
-          <a:p>
-            <a:pPr algn="just">
-              <a:lnSpc>
-                <a:spcPct val="150000"/>
-              </a:lnSpc>
-              <a:spcAft>
-                <a:spcPts val="1000"/>
-              </a:spcAft>
-            </a:pPr>
-            <a:r>
-              <a:rPr lang="en-US" sz="1900" dirty="0">
-                <a:effectLst/>
-                <a:latin typeface="Times New Roman" panose="02020603050405020304" pitchFamily="18" charset="0"/>
-                <a:ea typeface="Times New Roman" panose="02020603050405020304" pitchFamily="18" charset="0"/>
-                <a:cs typeface="Times New Roman" panose="02020603050405020304" pitchFamily="18" charset="0"/>
-              </a:rPr>
-              <a:t>This project is successfully implemented with all the features mentioned in system requirements specification.</a:t>
-            </a:r>
-            <a:endParaRPr lang="en-IN" sz="1900" dirty="0">
-              <a:effectLst/>
-              <a:latin typeface="Calibri" panose="020F0502020204030204" pitchFamily="34" charset="0"/>
-              <a:ea typeface="Times New Roman" panose="02020603050405020304" pitchFamily="18" charset="0"/>
-              <a:cs typeface="Times New Roman" panose="02020603050405020304" pitchFamily="18" charset="0"/>
-            </a:endParaRPr>
-          </a:p>
-          <a:p>
-            <a:pPr marL="342900" lvl="0" indent="-342900" algn="just">
-              <a:lnSpc>
-                <a:spcPct val="150000"/>
-              </a:lnSpc>
-              <a:spcAft>
-                <a:spcPts val="1000"/>
-              </a:spcAft>
-              <a:buFont typeface="Wingdings" panose="05000000000000000000" pitchFamily="2" charset="2"/>
-              <a:buChar char=""/>
-              <a:tabLst>
-                <a:tab pos="457200" algn="l"/>
-              </a:tabLst>
-            </a:pPr>
-            <a:r>
-              <a:rPr lang="en-US" sz="1900" dirty="0">
-                <a:effectLst/>
-                <a:latin typeface="Times New Roman" panose="02020603050405020304" pitchFamily="18" charset="0"/>
-                <a:ea typeface="Times New Roman" panose="02020603050405020304" pitchFamily="18" charset="0"/>
-                <a:cs typeface="Times New Roman" panose="02020603050405020304" pitchFamily="18" charset="0"/>
-              </a:rPr>
-              <a:t>The project is designed keeping in view the day to day problems faced by a college.</a:t>
-            </a:r>
-            <a:endParaRPr lang="en-IN" sz="1900" dirty="0">
-              <a:effectLst/>
-              <a:latin typeface="Calibri" panose="020F0502020204030204" pitchFamily="34" charset="0"/>
-              <a:ea typeface="Times New Roman" panose="02020603050405020304" pitchFamily="18" charset="0"/>
-              <a:cs typeface="Times New Roman" panose="02020603050405020304" pitchFamily="18" charset="0"/>
-            </a:endParaRPr>
-          </a:p>
-          <a:p>
-            <a:pPr marL="342900" lvl="0" indent="-342900" algn="just">
-              <a:lnSpc>
-                <a:spcPct val="150000"/>
-              </a:lnSpc>
-              <a:spcAft>
-                <a:spcPts val="1000"/>
-              </a:spcAft>
-              <a:buFont typeface="Wingdings" panose="05000000000000000000" pitchFamily="2" charset="2"/>
-              <a:buChar char=""/>
-              <a:tabLst>
-                <a:tab pos="457200" algn="l"/>
-              </a:tabLst>
-            </a:pPr>
-            <a:r>
-              <a:rPr lang="en-US" sz="1900" dirty="0">
-                <a:effectLst/>
-                <a:latin typeface="Times New Roman" panose="02020603050405020304" pitchFamily="18" charset="0"/>
-                <a:ea typeface="Times New Roman" panose="02020603050405020304" pitchFamily="18" charset="0"/>
-                <a:cs typeface="Times New Roman" panose="02020603050405020304" pitchFamily="18" charset="0"/>
-              </a:rPr>
-              <a:t>Deployment of our application will certainly help the college to reduce unnecessary wastage of time in personally going to each department for some information.</a:t>
-            </a:r>
-            <a:endParaRPr lang="en-IN" sz="1900" dirty="0">
-              <a:effectLst/>
-              <a:latin typeface="Calibri" panose="020F0502020204030204" pitchFamily="34" charset="0"/>
-              <a:ea typeface="Times New Roman" panose="02020603050405020304" pitchFamily="18" charset="0"/>
-              <a:cs typeface="Times New Roman" panose="02020603050405020304" pitchFamily="18" charset="0"/>
-            </a:endParaRPr>
-          </a:p>
-          <a:p>
-            <a:pPr algn="just">
-              <a:lnSpc>
-                <a:spcPct val="150000"/>
-              </a:lnSpc>
-              <a:spcAft>
-                <a:spcPts val="1000"/>
-              </a:spcAft>
-            </a:pPr>
-            <a:r>
-              <a:rPr lang="en-US" sz="1900" b="1" dirty="0">
-                <a:effectLst/>
-                <a:latin typeface="Times New Roman" panose="02020603050405020304" pitchFamily="18" charset="0"/>
-                <a:ea typeface="Times New Roman" panose="02020603050405020304" pitchFamily="18" charset="0"/>
-                <a:cs typeface="Times New Roman" panose="02020603050405020304" pitchFamily="18" charset="0"/>
-              </a:rPr>
-              <a:t> </a:t>
-            </a:r>
-            <a:r>
-              <a:rPr lang="en-US" sz="1900" dirty="0">
-                <a:effectLst/>
-                <a:latin typeface="Times New Roman" panose="02020603050405020304" pitchFamily="18" charset="0"/>
-                <a:ea typeface="Times New Roman" panose="02020603050405020304" pitchFamily="18" charset="0"/>
-                <a:cs typeface="Times New Roman" panose="02020603050405020304" pitchFamily="18" charset="0"/>
-              </a:rPr>
-              <a:t>Awareness and right information about any college is essential for both the development of student as well as faculty. So this serves the right purpose in achieving the desired requirements of both the communities</a:t>
-            </a:r>
-            <a:r>
-              <a:rPr lang="en-US" sz="1900" u="sng" dirty="0">
-                <a:effectLst/>
-                <a:latin typeface="Times New Roman" panose="02020603050405020304" pitchFamily="18" charset="0"/>
-                <a:ea typeface="Times New Roman" panose="02020603050405020304" pitchFamily="18" charset="0"/>
-                <a:cs typeface="Times New Roman" panose="02020603050405020304" pitchFamily="18" charset="0"/>
-              </a:rPr>
-              <a:t>.</a:t>
-            </a:r>
-            <a:endParaRPr lang="en-IN" sz="1900" dirty="0">
-              <a:effectLst/>
-              <a:latin typeface="Calibri" panose="020F0502020204030204" pitchFamily="34" charset="0"/>
-              <a:ea typeface="Times New Roman" panose="02020603050405020304" pitchFamily="18" charset="0"/>
-              <a:cs typeface="Times New Roman" panose="02020603050405020304" pitchFamily="18" charset="0"/>
-            </a:endParaRPr>
-          </a:p>
-          <a:p>
-            <a:endParaRPr lang="en-IN" dirty="0"/>
-          </a:p>
-        </p:txBody>
-      </p:sp>
+      </p:pic>
     </p:spTree>
     <p:extLst>
       <p:ext uri="{BB962C8B-B14F-4D97-AF65-F5344CB8AC3E}">
-        <p14:creationId xmlns:p14="http://schemas.microsoft.com/office/powerpoint/2010/main" val="1537919190"/>
+        <p14:creationId xmlns:p14="http://schemas.microsoft.com/office/powerpoint/2010/main" val="1367783162"/>
+      </p:ext>
+    </p:extLst>
+  </p:cSld>
+  <p:clrMapOvr>
+    <a:masterClrMapping/>
+  </p:clrMapOvr>
+</p:sld>
+</file>
+
+<file path=ppt/slides/slide11.xml><?xml version="1.0" encoding="utf-8"?>
+<p:sld xmlns:a="http://schemas.openxmlformats.org/drawingml/2006/main" xmlns:r="http://schemas.openxmlformats.org/officeDocument/2006/relationships" xmlns:p="http://schemas.openxmlformats.org/presentationml/2006/main">
+  <p:cSld>
+    <p:spTree>
+      <p:nvGrpSpPr>
+        <p:cNvPr id="1" name=""/>
+        <p:cNvGrpSpPr/>
+        <p:nvPr/>
+      </p:nvGrpSpPr>
+      <p:grpSpPr>
+        <a:xfrm>
+          <a:off x="0" y="0"/>
+          <a:ext cx="0" cy="0"/>
+          <a:chOff x="0" y="0"/>
+          <a:chExt cx="0" cy="0"/>
+        </a:xfrm>
+      </p:grpSpPr>
+      <p:pic>
+        <p:nvPicPr>
+          <p:cNvPr id="4" name="Picture 3">
+            <a:extLst>
+              <a:ext uri="{FF2B5EF4-FFF2-40B4-BE49-F238E27FC236}">
+                <a16:creationId xmlns:a16="http://schemas.microsoft.com/office/drawing/2014/main" id="{4CA7394E-D9BE-33E2-6067-1656BE3396CA}"/>
+              </a:ext>
+            </a:extLst>
+          </p:cNvPr>
+          <p:cNvPicPr>
+            <a:picLocks noChangeAspect="1"/>
+          </p:cNvPicPr>
+          <p:nvPr/>
+        </p:nvPicPr>
+        <p:blipFill>
+          <a:blip r:embed="rId2"/>
+          <a:stretch>
+            <a:fillRect/>
+          </a:stretch>
+        </p:blipFill>
+        <p:spPr>
+          <a:xfrm>
+            <a:off x="0" y="142875"/>
+            <a:ext cx="12192000" cy="6572250"/>
+          </a:xfrm>
+          <a:prstGeom prst="rect">
+            <a:avLst/>
+          </a:prstGeom>
+        </p:spPr>
+      </p:pic>
+    </p:spTree>
+    <p:extLst>
+      <p:ext uri="{BB962C8B-B14F-4D97-AF65-F5344CB8AC3E}">
+        <p14:creationId xmlns:p14="http://schemas.microsoft.com/office/powerpoint/2010/main" val="3370424322"/>
+      </p:ext>
+    </p:extLst>
+  </p:cSld>
+  <p:clrMapOvr>
+    <a:masterClrMapping/>
+  </p:clrMapOvr>
+</p:sld>
+</file>
+
+<file path=ppt/slides/slide12.xml><?xml version="1.0" encoding="utf-8"?>
+<p:sld xmlns:a="http://schemas.openxmlformats.org/drawingml/2006/main" xmlns:r="http://schemas.openxmlformats.org/officeDocument/2006/relationships" xmlns:p="http://schemas.openxmlformats.org/presentationml/2006/main">
+  <p:cSld>
+    <p:spTree>
+      <p:nvGrpSpPr>
+        <p:cNvPr id="1" name=""/>
+        <p:cNvGrpSpPr/>
+        <p:nvPr/>
+      </p:nvGrpSpPr>
+      <p:grpSpPr>
+        <a:xfrm>
+          <a:off x="0" y="0"/>
+          <a:ext cx="0" cy="0"/>
+          <a:chOff x="0" y="0"/>
+          <a:chExt cx="0" cy="0"/>
+        </a:xfrm>
+      </p:grpSpPr>
+      <p:pic>
+        <p:nvPicPr>
+          <p:cNvPr id="3" name="Picture 2">
+            <a:extLst>
+              <a:ext uri="{FF2B5EF4-FFF2-40B4-BE49-F238E27FC236}">
+                <a16:creationId xmlns:a16="http://schemas.microsoft.com/office/drawing/2014/main" id="{E4A5172E-A7A9-8584-6F35-A5A7AEF5707E}"/>
+              </a:ext>
+            </a:extLst>
+          </p:cNvPr>
+          <p:cNvPicPr>
+            <a:picLocks noChangeAspect="1"/>
+          </p:cNvPicPr>
+          <p:nvPr/>
+        </p:nvPicPr>
+        <p:blipFill>
+          <a:blip r:embed="rId2"/>
+          <a:stretch>
+            <a:fillRect/>
+          </a:stretch>
+        </p:blipFill>
+        <p:spPr>
+          <a:xfrm>
+            <a:off x="4762" y="157162"/>
+            <a:ext cx="12182475" cy="6543675"/>
+          </a:xfrm>
+          <a:prstGeom prst="rect">
+            <a:avLst/>
+          </a:prstGeom>
+        </p:spPr>
+      </p:pic>
+    </p:spTree>
+    <p:extLst>
+      <p:ext uri="{BB962C8B-B14F-4D97-AF65-F5344CB8AC3E}">
+        <p14:creationId xmlns:p14="http://schemas.microsoft.com/office/powerpoint/2010/main" val="336049655"/>
       </p:ext>
     </p:extLst>
   </p:cSld>
@@ -6630,7 +6594,7 @@
           <a:p>
             <a:r>
               <a:rPr lang="en-US" sz="2400" dirty="0"/>
-              <a:t>The COLLEGE MANAGEMENT SYSTEM can be used to store student information like attendance , fees, and result etc. admin can create report regarding any student any                                           time using this system. </a:t>
+              <a:t>The COLLEGE MANAGEMENT SYSTEM can be used to store student information, course, faculty, department etc. admin can edit, delete and add any student, course, subject                                      using this system. </a:t>
             </a:r>
           </a:p>
           <a:p>
@@ -6749,13 +6713,13 @@
           <a:p>
             <a:r>
               <a:rPr lang="en-US" sz="2400" dirty="0"/>
-              <a:t>The main objective of college management system is to automate all functionalities of a college university. </a:t>
+              <a:t>The main objective of college management system is to automate all functionalities of a college. </a:t>
             </a:r>
           </a:p>
           <a:p>
             <a:r>
               <a:rPr lang="en-US" sz="2400" dirty="0"/>
-              <a:t>Using this system you can manage all college management work like admission, fees submission, time table management and result declaration.</a:t>
+              <a:t>Using this system you can manage all college student details , faculty details, course details, subject details etc.</a:t>
             </a:r>
           </a:p>
           <a:p>
@@ -7017,13 +6981,29 @@
           <a:p>
             <a:r>
               <a:rPr lang="en-IN" sz="2400" dirty="0"/>
-              <a:t>  System : P IV or above</a:t>
-            </a:r>
-          </a:p>
-          <a:p>
+              <a:t>  System : i3 2</a:t>
+            </a:r>
+            <a:r>
+              <a:rPr lang="en-IN" sz="2400" baseline="30000" dirty="0"/>
+              <a:t>nd</a:t>
+            </a:r>
             <a:r>
               <a:rPr lang="en-IN" sz="2400" dirty="0"/>
-              <a:t>  RAM : 1 GB</a:t>
+              <a:t> gen</a:t>
+            </a:r>
+          </a:p>
+          <a:p>
+            <a:r>
+              <a:rPr lang="en-IN" sz="2400" dirty="0"/>
+              <a:t>  RAM </a:t>
+            </a:r>
+            <a:r>
+              <a:rPr lang="en-IN" sz="2400"/>
+              <a:t>: 2 </a:t>
+            </a:r>
+            <a:r>
+              <a:rPr lang="en-IN" sz="2400" dirty="0"/>
+              <a:t>GB</a:t>
             </a:r>
           </a:p>
           <a:p>
@@ -7228,37 +7208,7 @@
                 <a:ea typeface="Times New Roman" panose="02020603050405020304" pitchFamily="18" charset="0"/>
                 <a:cs typeface="Times New Roman" panose="02020603050405020304" pitchFamily="18" charset="0"/>
               </a:rPr>
-              <a:t>This is a web-related application that permits us to approach the entire knowledge regarding the college, employees, students, faculties etc. This application is also called as College management system. </a:t>
-            </a:r>
-            <a:endParaRPr lang="en-IN" sz="2000" dirty="0">
-              <a:solidFill>
-                <a:srgbClr val="808080"/>
-              </a:solidFill>
-              <a:latin typeface="Roboto" panose="02000000000000000000" pitchFamily="2" charset="0"/>
-              <a:ea typeface="Times New Roman" panose="02020603050405020304" pitchFamily="18" charset="0"/>
-              <a:cs typeface="Times New Roman" panose="02020603050405020304" pitchFamily="18" charset="0"/>
-            </a:endParaRPr>
-          </a:p>
-          <a:p>
-            <a:pPr marL="342900" lvl="0" indent="-342900" algn="just">
-              <a:buSzPts val="1000"/>
-              <a:buFont typeface="Symbol" panose="05050102010706020507" pitchFamily="18" charset="2"/>
-              <a:buChar char=""/>
-              <a:tabLst>
-                <a:tab pos="457200" algn="l"/>
-              </a:tabLst>
-            </a:pPr>
-            <a:r>
-              <a:rPr lang="en-IN" sz="2000" dirty="0">
-                <a:solidFill>
-                  <a:srgbClr val="808080"/>
-                </a:solidFill>
-                <a:effectLst/>
-                <a:latin typeface="Roboto" panose="02000000000000000000" pitchFamily="2" charset="0"/>
-                <a:ea typeface="Times New Roman" panose="02020603050405020304" pitchFamily="18" charset="0"/>
-                <a:cs typeface="Times New Roman" panose="02020603050405020304" pitchFamily="18" charset="0"/>
-              </a:rPr>
-              <a:t> This general application planned for aiding the students of an organization about details on the courses, subjects, classes, assignments, grades and time-table. It also allows the faculty to know his time-table, upload assignments and issue circulars to the pupil. </a:t>
+              <a:t>This is a web-related application that permits us to approach the entire knowledge regarding the college, employees, students, faculties etc.  </a:t>
             </a:r>
             <a:endParaRPr lang="en-IN" sz="2000" dirty="0">
               <a:effectLst/>
@@ -7335,7 +7285,7 @@
           <p:cNvPr id="2" name="Title 1">
             <a:extLst>
               <a:ext uri="{FF2B5EF4-FFF2-40B4-BE49-F238E27FC236}">
-                <a16:creationId xmlns:a16="http://schemas.microsoft.com/office/drawing/2014/main" id="{9D573BFC-F604-0A1C-15FF-76E4A755E03B}"/>
+                <a16:creationId xmlns:a16="http://schemas.microsoft.com/office/drawing/2014/main" id="{5CCF32DD-FAD2-BE0D-34AB-3D4A5570C6A0}"/>
               </a:ext>
             </a:extLst>
           </p:cNvPr>
@@ -7346,23 +7296,23 @@
             <p:ph type="title"/>
           </p:nvPr>
         </p:nvSpPr>
-        <p:spPr/>
-        <p:txBody>
-          <a:bodyPr/>
+        <p:spPr>
+          <a:xfrm>
+            <a:off x="677334" y="397566"/>
+            <a:ext cx="8596668" cy="842838"/>
+          </a:xfrm>
+        </p:spPr>
+        <p:txBody>
+          <a:bodyPr>
+            <a:normAutofit/>
+          </a:bodyPr>
           <a:lstStyle/>
           <a:p>
             <a:r>
-              <a:rPr lang="en-IN" dirty="0"/>
-              <a:t>            </a:t>
-            </a:r>
-            <a:r>
-              <a:rPr lang="en-IN" dirty="0">
-                <a:solidFill>
-                  <a:schemeClr val="accent4"/>
-                </a:solidFill>
-              </a:rPr>
-              <a:t>Spring Annotations</a:t>
-            </a:r>
+              <a:rPr lang="en-US" sz="4000" dirty="0"/>
+              <a:t>               Spring Annotations</a:t>
+            </a:r>
+            <a:endParaRPr lang="en-IN" sz="4000" dirty="0"/>
           </a:p>
         </p:txBody>
       </p:sp>
@@ -7371,7 +7321,7 @@
           <p:cNvPr id="4" name="Table 4">
             <a:extLst>
               <a:ext uri="{FF2B5EF4-FFF2-40B4-BE49-F238E27FC236}">
-                <a16:creationId xmlns:a16="http://schemas.microsoft.com/office/drawing/2014/main" id="{523075BF-E648-2D5D-46E8-FA6DD83ED8A6}"/>
+                <a16:creationId xmlns:a16="http://schemas.microsoft.com/office/drawing/2014/main" id="{77C1F4C8-4123-3687-BEA9-CD099A958178}"/>
               </a:ext>
             </a:extLst>
           </p:cNvPr>
@@ -7382,14 +7332,14 @@
             <p:ph idx="1"/>
             <p:extLst>
               <p:ext uri="{D42A27DB-BD31-4B8C-83A1-F6EECF244321}">
-                <p14:modId xmlns:p14="http://schemas.microsoft.com/office/powerpoint/2010/main" val="2841133453"/>
+                <p14:modId xmlns:p14="http://schemas.microsoft.com/office/powerpoint/2010/main" val="2412554128"/>
               </p:ext>
             </p:extLst>
           </p:nvPr>
         </p:nvGraphicFramePr>
         <p:xfrm>
-          <a:off x="408562" y="2159540"/>
-          <a:ext cx="9396920" cy="4588047"/>
+          <a:off x="556591" y="1240403"/>
+          <a:ext cx="10145863" cy="5577840"/>
         </p:xfrm>
         <a:graphic>
           <a:graphicData uri="http://schemas.openxmlformats.org/drawingml/2006/table">
@@ -7398,28 +7348,28 @@
                 <a:tableStyleId>{5C22544A-7EE6-4342-B048-85BDC9FD1C3A}</a:tableStyleId>
               </a:tblPr>
               <a:tblGrid>
-                <a:gridCol w="2295727">
+                <a:gridCol w="2100570">
                   <a:extLst>
                     <a:ext uri="{9D8B030D-6E8A-4147-A177-3AD203B41FA5}">
-                      <a16:colId xmlns:a16="http://schemas.microsoft.com/office/drawing/2014/main" val="2776071343"/>
+                      <a16:colId xmlns:a16="http://schemas.microsoft.com/office/drawing/2014/main" val="2598508061"/>
                     </a:ext>
                   </a:extLst>
                 </a:gridCol>
-                <a:gridCol w="7101193">
+                <a:gridCol w="8045293">
                   <a:extLst>
                     <a:ext uri="{9D8B030D-6E8A-4147-A177-3AD203B41FA5}">
-                      <a16:colId xmlns:a16="http://schemas.microsoft.com/office/drawing/2014/main" val="1697931717"/>
+                      <a16:colId xmlns:a16="http://schemas.microsoft.com/office/drawing/2014/main" val="589217234"/>
                     </a:ext>
                   </a:extLst>
                 </a:gridCol>
               </a:tblGrid>
-              <a:tr h="372823">
+              <a:tr h="363935">
                 <a:tc>
                   <a:txBody>
                     <a:bodyPr/>
                     <a:lstStyle/>
                     <a:p>
-                      <a:endParaRPr lang="en-IN" b="0" dirty="0"/>
+                      <a:endParaRPr lang="en-IN"/>
                     </a:p>
                   </a:txBody>
                   <a:tcPr/>
@@ -7436,53 +7386,11 @@
                 </a:tc>
                 <a:extLst>
                   <a:ext uri="{0D108BD9-81ED-4DB2-BD59-A6C34878D82A}">
-                    <a16:rowId xmlns:a16="http://schemas.microsoft.com/office/drawing/2014/main" val="4000781663"/>
+                    <a16:rowId xmlns:a16="http://schemas.microsoft.com/office/drawing/2014/main" val="1215344173"/>
                   </a:ext>
                 </a:extLst>
               </a:tr>
-              <a:tr h="642001">
-                <a:tc>
-                  <a:txBody>
-                    <a:bodyPr/>
-                    <a:lstStyle/>
-                    <a:p>
-                      <a:r>
-                        <a:rPr lang="en-IN" b="1" dirty="0"/>
-                        <a:t>@Service</a:t>
-                      </a:r>
-                    </a:p>
-                  </a:txBody>
-                  <a:tcPr/>
-                </a:tc>
-                <a:tc>
-                  <a:txBody>
-                    <a:bodyPr/>
-                    <a:lstStyle/>
-                    <a:p>
-                      <a:r>
-                        <a:rPr lang="en-IN" sz="1800" b="0" i="0" kern="1200" dirty="0">
-                          <a:solidFill>
-                            <a:schemeClr val="dk1"/>
-                          </a:solidFill>
-                          <a:effectLst/>
-                          <a:latin typeface="+mn-lt"/>
-                          <a:ea typeface="+mn-ea"/>
-                          <a:cs typeface="+mn-cs"/>
-                        </a:rPr>
-                        <a:t>importorg.springframework.stereotype.Service</a:t>
-                      </a:r>
-                      <a:endParaRPr lang="en-IN" dirty="0"/>
-                    </a:p>
-                  </a:txBody>
-                  <a:tcPr/>
-                </a:tc>
-                <a:extLst>
-                  <a:ext uri="{0D108BD9-81ED-4DB2-BD59-A6C34878D82A}">
-                    <a16:rowId xmlns:a16="http://schemas.microsoft.com/office/drawing/2014/main" val="3611580935"/>
-                  </a:ext>
-                </a:extLst>
-              </a:tr>
-              <a:tr h="372823">
+              <a:tr h="818854">
                 <a:tc>
                   <a:txBody>
                     <a:bodyPr/>
@@ -7506,7 +7414,7 @@
                         <a:defRPr/>
                       </a:pPr>
                       <a:r>
-                        <a:rPr lang="en-IN" sz="1800" b="1" i="0" kern="1200" dirty="0">
+                        <a:rPr lang="en-IN" sz="1800" kern="1200" dirty="0">
                           <a:solidFill>
                             <a:schemeClr val="dk1"/>
                           </a:solidFill>
@@ -7515,7 +7423,7 @@
                           <a:ea typeface="+mn-ea"/>
                           <a:cs typeface="+mn-cs"/>
                         </a:rPr>
-                        <a:t>@Repository</a:t>
+                        <a:t>@Service</a:t>
                       </a:r>
                     </a:p>
                     <a:p>
@@ -7524,35 +7432,6 @@
                   </a:txBody>
                   <a:tcPr/>
                 </a:tc>
-                <a:tc>
-                  <a:txBody>
-                    <a:bodyPr/>
-                    <a:lstStyle/>
-                    <a:p>
-                      <a:r>
-                        <a:rPr lang="en-IN" sz="1800" b="0" i="0" kern="1200" dirty="0">
-                          <a:solidFill>
-                            <a:schemeClr val="dk1"/>
-                          </a:solidFill>
-                          <a:effectLst/>
-                          <a:latin typeface="+mn-lt"/>
-                          <a:ea typeface="+mn-ea"/>
-                          <a:cs typeface="+mn-cs"/>
-                        </a:rPr>
-                        <a:t>import org.springframework.stereotype.Repository;</a:t>
-                      </a:r>
-                      <a:endParaRPr lang="en-IN" dirty="0"/>
-                    </a:p>
-                  </a:txBody>
-                  <a:tcPr/>
-                </a:tc>
-                <a:extLst>
-                  <a:ext uri="{0D108BD9-81ED-4DB2-BD59-A6C34878D82A}">
-                    <a16:rowId xmlns:a16="http://schemas.microsoft.com/office/drawing/2014/main" val="1290938411"/>
-                  </a:ext>
-                </a:extLst>
-              </a:tr>
-              <a:tr h="372823">
                 <a:tc>
                   <a:txBody>
                     <a:bodyPr/>
@@ -7576,7 +7455,7 @@
                         <a:defRPr/>
                       </a:pPr>
                       <a:r>
-                        <a:rPr lang="en-IN" sz="1800" b="1" i="0" kern="1200" dirty="0">
+                        <a:rPr lang="en-IN" sz="1600" b="0" kern="1200" dirty="0">
                           <a:solidFill>
                             <a:schemeClr val="dk1"/>
                           </a:solidFill>
@@ -7585,44 +7464,19 @@
                           <a:ea typeface="+mn-ea"/>
                           <a:cs typeface="+mn-cs"/>
                         </a:rPr>
-                        <a:t>@Component</a:t>
+                        <a:t>@Service annotation is used with classes that provide some business functionalities. Spring context will auto detect these classes when annotation-based configuration and class path scanning is used.</a:t>
                       </a:r>
-                    </a:p>
-                    <a:p>
-                      <a:endParaRPr lang="en-IN" dirty="0"/>
-                    </a:p>
-                  </a:txBody>
-                  <a:tcPr/>
-                </a:tc>
-                <a:tc>
-                  <a:txBody>
-                    <a:bodyPr/>
-                    <a:lstStyle/>
-                    <a:p>
-                      <a:r>
-                        <a:rPr lang="en-IN" sz="1800" b="0" i="0" kern="1200" dirty="0">
-                          <a:solidFill>
-                            <a:schemeClr val="dk1"/>
-                          </a:solidFill>
-                          <a:effectLst/>
-                          <a:latin typeface="+mn-lt"/>
-                          <a:ea typeface="+mn-ea"/>
-                          <a:cs typeface="+mn-cs"/>
-                        </a:rPr>
-                        <a:t>import org.springframework.stereotype.Component;</a:t>
-                      </a:r>
-                      <a:endParaRPr lang="en-IN" dirty="0"/>
                     </a:p>
                   </a:txBody>
                   <a:tcPr/>
                 </a:tc>
                 <a:extLst>
                   <a:ext uri="{0D108BD9-81ED-4DB2-BD59-A6C34878D82A}">
-                    <a16:rowId xmlns:a16="http://schemas.microsoft.com/office/drawing/2014/main" val="2873435124"/>
+                    <a16:rowId xmlns:a16="http://schemas.microsoft.com/office/drawing/2014/main" val="2946877647"/>
                   </a:ext>
                 </a:extLst>
               </a:tr>
-              <a:tr h="372823">
+              <a:tr h="636886">
                 <a:tc>
                   <a:txBody>
                     <a:bodyPr/>
@@ -7646,7 +7500,7 @@
                         <a:defRPr/>
                       </a:pPr>
                       <a:r>
-                        <a:rPr lang="en-IN" sz="1800" b="1" i="0" kern="1200" dirty="0">
+                        <a:rPr lang="en-IN" sz="1800" kern="1200" dirty="0">
                           <a:solidFill>
                             <a:schemeClr val="dk1"/>
                           </a:solidFill>
@@ -7655,7 +7509,7 @@
                           <a:ea typeface="+mn-ea"/>
                           <a:cs typeface="+mn-cs"/>
                         </a:rPr>
-                        <a:t>@Autowired</a:t>
+                        <a:t>@Id</a:t>
                       </a:r>
                     </a:p>
                     <a:p>
@@ -7664,35 +7518,6 @@
                   </a:txBody>
                   <a:tcPr/>
                 </a:tc>
-                <a:tc>
-                  <a:txBody>
-                    <a:bodyPr/>
-                    <a:lstStyle/>
-                    <a:p>
-                      <a:r>
-                        <a:rPr lang="en-IN" sz="1800" b="0" i="0" kern="1200" dirty="0">
-                          <a:solidFill>
-                            <a:schemeClr val="dk1"/>
-                          </a:solidFill>
-                          <a:effectLst/>
-                          <a:latin typeface="+mn-lt"/>
-                          <a:ea typeface="+mn-ea"/>
-                          <a:cs typeface="+mn-cs"/>
-                        </a:rPr>
-                        <a:t>import org.springframework.beans.factory.annotation.Autowired;</a:t>
-                      </a:r>
-                      <a:endParaRPr lang="en-IN" dirty="0"/>
-                    </a:p>
-                  </a:txBody>
-                  <a:tcPr/>
-                </a:tc>
-                <a:extLst>
-                  <a:ext uri="{0D108BD9-81ED-4DB2-BD59-A6C34878D82A}">
-                    <a16:rowId xmlns:a16="http://schemas.microsoft.com/office/drawing/2014/main" val="209478922"/>
-                  </a:ext>
-                </a:extLst>
-              </a:tr>
-              <a:tr h="372823">
                 <a:tc>
                   <a:txBody>
                     <a:bodyPr/>
@@ -7716,7 +7541,7 @@
                         <a:defRPr/>
                       </a:pPr>
                       <a:r>
-                        <a:rPr lang="en-IN" sz="1800" b="1" i="0" kern="1200" dirty="0">
+                        <a:rPr lang="en-IN" sz="1600" kern="1200" dirty="0">
                           <a:solidFill>
                             <a:schemeClr val="dk1"/>
                           </a:solidFill>
@@ -7725,68 +7550,19 @@
                           <a:ea typeface="+mn-ea"/>
                           <a:cs typeface="+mn-cs"/>
                         </a:rPr>
-                        <a:t>@Transactiona</a:t>
+                        <a:t>This annotation is used to specify the primary key generation strategy to use i.e., Instructs database to generate a value for this field automatically.</a:t>
                       </a:r>
-                    </a:p>
-                    <a:p>
-                      <a:endParaRPr lang="en-IN" dirty="0"/>
-                    </a:p>
-                  </a:txBody>
-                  <a:tcPr/>
-                </a:tc>
-                <a:tc>
-                  <a:txBody>
-                    <a:bodyPr/>
-                    <a:lstStyle/>
-                    <a:p>
-                      <a:r>
-                        <a:rPr lang="en-IN" sz="1800" b="0" i="0" kern="1200" dirty="0">
-                          <a:solidFill>
-                            <a:schemeClr val="dk1"/>
-                          </a:solidFill>
-                          <a:effectLst/>
-                          <a:latin typeface="+mn-lt"/>
-                          <a:ea typeface="+mn-ea"/>
-                          <a:cs typeface="+mn-cs"/>
-                        </a:rPr>
-                        <a:t>import </a:t>
-                      </a:r>
-                      <a:r>
-                        <a:rPr lang="en-IN" sz="1800" b="0" i="0" kern="1200" dirty="0" err="1">
-                          <a:solidFill>
-                            <a:schemeClr val="dk1"/>
-                          </a:solidFill>
-                          <a:effectLst/>
-                          <a:latin typeface="+mn-lt"/>
-                          <a:ea typeface="+mn-ea"/>
-                          <a:cs typeface="+mn-cs"/>
-                        </a:rPr>
-                        <a:t>org.springframework.transaction.annotation.Transactional</a:t>
-                      </a:r>
-                      <a:r>
-                        <a:rPr lang="en-IN" sz="1800" b="0" i="0" kern="1200" dirty="0">
-                          <a:solidFill>
-                            <a:schemeClr val="dk1"/>
-                          </a:solidFill>
-                          <a:effectLst/>
-                          <a:latin typeface="+mn-lt"/>
-                          <a:ea typeface="+mn-ea"/>
-                          <a:cs typeface="+mn-cs"/>
-                        </a:rPr>
-                        <a:t>;</a:t>
-                      </a:r>
-                      <a:endParaRPr lang="en-IN" dirty="0"/>
                     </a:p>
                   </a:txBody>
                   <a:tcPr/>
                 </a:tc>
                 <a:extLst>
                   <a:ext uri="{0D108BD9-81ED-4DB2-BD59-A6C34878D82A}">
-                    <a16:rowId xmlns:a16="http://schemas.microsoft.com/office/drawing/2014/main" val="1706604319"/>
+                    <a16:rowId xmlns:a16="http://schemas.microsoft.com/office/drawing/2014/main" val="112302084"/>
                   </a:ext>
                 </a:extLst>
               </a:tr>
-              <a:tr h="372823">
+              <a:tr h="818854">
                 <a:tc>
                   <a:txBody>
                     <a:bodyPr/>
@@ -7810,7 +7586,7 @@
                         <a:defRPr/>
                       </a:pPr>
                       <a:r>
-                        <a:rPr lang="en-IN" sz="1800" b="1" i="0" kern="1200" dirty="0">
+                        <a:rPr lang="en-IN" sz="1800" kern="1200" dirty="0">
                           <a:solidFill>
                             <a:schemeClr val="dk1"/>
                           </a:solidFill>
@@ -7819,7 +7595,7 @@
                           <a:ea typeface="+mn-ea"/>
                           <a:cs typeface="+mn-cs"/>
                         </a:rPr>
-                        <a:t>@Scope</a:t>
+                        <a:t>@GeneratedValue</a:t>
                       </a:r>
                     </a:p>
                     <a:p>
@@ -7833,8 +7609,25 @@
                     <a:bodyPr/>
                     <a:lstStyle/>
                     <a:p>
+                      <a:pPr marL="0" marR="0" lvl="0" indent="0" algn="l" defTabSz="457200" rtl="0" eaLnBrk="1" fontAlgn="auto" latinLnBrk="0" hangingPunct="1">
+                        <a:lnSpc>
+                          <a:spcPct val="100000"/>
+                        </a:lnSpc>
+                        <a:spcBef>
+                          <a:spcPts val="0"/>
+                        </a:spcBef>
+                        <a:spcAft>
+                          <a:spcPts val="0"/>
+                        </a:spcAft>
+                        <a:buClrTx/>
+                        <a:buSzTx/>
+                        <a:buFontTx/>
+                        <a:buNone/>
+                        <a:tabLst/>
+                        <a:defRPr/>
+                      </a:pPr>
                       <a:r>
-                        <a:rPr lang="en-IN" sz="1800" b="0" i="0" kern="1200" dirty="0">
+                        <a:rPr lang="en-IN" sz="1600" kern="1200" dirty="0">
                           <a:solidFill>
                             <a:schemeClr val="dk1"/>
                           </a:solidFill>
@@ -7843,10 +7636,43 @@
                           <a:ea typeface="+mn-ea"/>
                           <a:cs typeface="+mn-cs"/>
                         </a:rPr>
-                        <a:t>import </a:t>
+                        <a:t>Provides for the specification of generation strategies for the values of primary keys. The Generated Value annotation may be applied to a primary key property or field of an entity or mapped superclass in conjunction with the Id annotation.</a:t>
                       </a:r>
+                    </a:p>
+                  </a:txBody>
+                  <a:tcPr/>
+                </a:tc>
+                <a:extLst>
+                  <a:ext uri="{0D108BD9-81ED-4DB2-BD59-A6C34878D82A}">
+                    <a16:rowId xmlns:a16="http://schemas.microsoft.com/office/drawing/2014/main" val="2906777918"/>
+                  </a:ext>
+                </a:extLst>
+              </a:tr>
+              <a:tr h="818854">
+                <a:tc>
+                  <a:txBody>
+                    <a:bodyPr/>
+                    <a:lstStyle/>
+                    <a:p>
+                      <a:pPr marL="0" marR="0" lvl="0" indent="0" algn="l" defTabSz="457200" rtl="0" eaLnBrk="1" fontAlgn="auto" latinLnBrk="0" hangingPunct="1">
+                        <a:lnSpc>
+                          <a:spcPct val="100000"/>
+                        </a:lnSpc>
+                        <a:spcBef>
+                          <a:spcPts val="0"/>
+                        </a:spcBef>
+                        <a:spcAft>
+                          <a:spcPts val="0"/>
+                        </a:spcAft>
+                        <a:buClrTx/>
+                        <a:buSzTx/>
+                        <a:buFontTx/>
+                        <a:buNone/>
+                        <a:tabLst/>
+                        <a:defRPr/>
+                      </a:pPr>
                       <a:r>
-                        <a:rPr lang="en-IN" sz="1800" b="0" i="0" kern="1200" dirty="0" err="1">
+                        <a:rPr lang="en-IN" sz="1800" kern="1200" dirty="0">
                           <a:solidFill>
                             <a:schemeClr val="dk1"/>
                           </a:solidFill>
@@ -7855,38 +7681,11 @@
                           <a:ea typeface="+mn-ea"/>
                           <a:cs typeface="+mn-cs"/>
                         </a:rPr>
-                        <a:t>org.springframework.context.annotation.Scope</a:t>
+                        <a:t>@Transactional</a:t>
                       </a:r>
-                      <a:r>
-                        <a:rPr lang="en-IN" sz="1800" b="0" i="0" kern="1200" dirty="0">
-                          <a:solidFill>
-                            <a:schemeClr val="dk1"/>
-                          </a:solidFill>
-                          <a:effectLst/>
-                          <a:latin typeface="+mn-lt"/>
-                          <a:ea typeface="+mn-ea"/>
-                          <a:cs typeface="+mn-cs"/>
-                        </a:rPr>
-                        <a:t>;</a:t>
-                      </a:r>
+                    </a:p>
+                    <a:p>
                       <a:endParaRPr lang="en-IN" dirty="0"/>
-                    </a:p>
-                  </a:txBody>
-                  <a:tcPr/>
-                </a:tc>
-                <a:extLst>
-                  <a:ext uri="{0D108BD9-81ED-4DB2-BD59-A6C34878D82A}">
-                    <a16:rowId xmlns:a16="http://schemas.microsoft.com/office/drawing/2014/main" val="583131390"/>
-                  </a:ext>
-                </a:extLst>
-              </a:tr>
-              <a:tr h="372823">
-                <a:tc>
-                  <a:txBody>
-                    <a:bodyPr/>
-                    <a:lstStyle/>
-                    <a:p>
-                      <a:endParaRPr lang="en-IN"/>
                     </a:p>
                   </a:txBody>
                   <a:tcPr/>
@@ -7896,14 +7695,312 @@
                     <a:bodyPr/>
                     <a:lstStyle/>
                     <a:p>
-                      <a:endParaRPr lang="en-IN" dirty="0"/>
+                      <a:pPr marL="0" marR="0" lvl="0" indent="0" algn="l" defTabSz="457200" rtl="0" eaLnBrk="1" fontAlgn="auto" latinLnBrk="0" hangingPunct="1">
+                        <a:lnSpc>
+                          <a:spcPct val="100000"/>
+                        </a:lnSpc>
+                        <a:spcBef>
+                          <a:spcPts val="0"/>
+                        </a:spcBef>
+                        <a:spcAft>
+                          <a:spcPts val="0"/>
+                        </a:spcAft>
+                        <a:buClrTx/>
+                        <a:buSzTx/>
+                        <a:buFontTx/>
+                        <a:buNone/>
+                        <a:tabLst/>
+                        <a:defRPr/>
+                      </a:pPr>
+                      <a:r>
+                        <a:rPr lang="en-IN" sz="1600" kern="1200" dirty="0">
+                          <a:solidFill>
+                            <a:schemeClr val="dk1"/>
+                          </a:solidFill>
+                          <a:effectLst/>
+                          <a:latin typeface="+mn-lt"/>
+                          <a:ea typeface="+mn-ea"/>
+                          <a:cs typeface="+mn-cs"/>
+                        </a:rPr>
+                        <a:t>@Transactional annotation is the metadata that specifies the semantics of the transactions on a method. We have two ways to rollback a transaction: declarative and programmatic.</a:t>
+                      </a:r>
                     </a:p>
                   </a:txBody>
                   <a:tcPr/>
                 </a:tc>
                 <a:extLst>
                   <a:ext uri="{0D108BD9-81ED-4DB2-BD59-A6C34878D82A}">
-                    <a16:rowId xmlns:a16="http://schemas.microsoft.com/office/drawing/2014/main" val="3584254076"/>
+                    <a16:rowId xmlns:a16="http://schemas.microsoft.com/office/drawing/2014/main" val="1975193965"/>
+                  </a:ext>
+                </a:extLst>
+              </a:tr>
+              <a:tr h="636886">
+                <a:tc>
+                  <a:txBody>
+                    <a:bodyPr/>
+                    <a:lstStyle/>
+                    <a:p>
+                      <a:pPr marL="0" marR="0" lvl="0" indent="0" algn="l" defTabSz="457200" rtl="0" eaLnBrk="1" fontAlgn="auto" latinLnBrk="0" hangingPunct="1">
+                        <a:lnSpc>
+                          <a:spcPct val="100000"/>
+                        </a:lnSpc>
+                        <a:spcBef>
+                          <a:spcPts val="0"/>
+                        </a:spcBef>
+                        <a:spcAft>
+                          <a:spcPts val="0"/>
+                        </a:spcAft>
+                        <a:buClrTx/>
+                        <a:buSzTx/>
+                        <a:buFontTx/>
+                        <a:buNone/>
+                        <a:tabLst/>
+                        <a:defRPr/>
+                      </a:pPr>
+                      <a:r>
+                        <a:rPr lang="en-IN" sz="1800" kern="1200" dirty="0">
+                          <a:solidFill>
+                            <a:schemeClr val="dk1"/>
+                          </a:solidFill>
+                          <a:effectLst/>
+                          <a:latin typeface="+mn-lt"/>
+                          <a:ea typeface="+mn-ea"/>
+                          <a:cs typeface="+mn-cs"/>
+                        </a:rPr>
+                        <a:t>@Entity</a:t>
+                      </a:r>
+                    </a:p>
+                    <a:p>
+                      <a:endParaRPr lang="en-IN" dirty="0"/>
+                    </a:p>
+                  </a:txBody>
+                  <a:tcPr/>
+                </a:tc>
+                <a:tc>
+                  <a:txBody>
+                    <a:bodyPr/>
+                    <a:lstStyle/>
+                    <a:p>
+                      <a:pPr marL="0" marR="0" lvl="0" indent="0" algn="l" defTabSz="457200" rtl="0" eaLnBrk="1" fontAlgn="auto" latinLnBrk="0" hangingPunct="1">
+                        <a:lnSpc>
+                          <a:spcPct val="100000"/>
+                        </a:lnSpc>
+                        <a:spcBef>
+                          <a:spcPts val="0"/>
+                        </a:spcBef>
+                        <a:spcAft>
+                          <a:spcPts val="0"/>
+                        </a:spcAft>
+                        <a:buClrTx/>
+                        <a:buSzTx/>
+                        <a:buFontTx/>
+                        <a:buNone/>
+                        <a:tabLst/>
+                        <a:defRPr/>
+                      </a:pPr>
+                      <a:r>
+                        <a:rPr lang="en-IN" sz="1600" kern="1200" dirty="0">
+                          <a:solidFill>
+                            <a:schemeClr val="dk1"/>
+                          </a:solidFill>
+                          <a:effectLst/>
+                          <a:latin typeface="+mn-lt"/>
+                          <a:ea typeface="+mn-ea"/>
+                          <a:cs typeface="+mn-cs"/>
+                        </a:rPr>
+                        <a:t>The @Entity annotation specifies that the class is an entity and is mapped to a database table. </a:t>
+                      </a:r>
+                    </a:p>
+                  </a:txBody>
+                  <a:tcPr/>
+                </a:tc>
+                <a:extLst>
+                  <a:ext uri="{0D108BD9-81ED-4DB2-BD59-A6C34878D82A}">
+                    <a16:rowId xmlns:a16="http://schemas.microsoft.com/office/drawing/2014/main" val="2117662805"/>
+                  </a:ext>
+                </a:extLst>
+              </a:tr>
+              <a:tr h="818854">
+                <a:tc>
+                  <a:txBody>
+                    <a:bodyPr/>
+                    <a:lstStyle/>
+                    <a:p>
+                      <a:pPr marL="0" marR="0" lvl="0" indent="0" algn="l" defTabSz="457200" rtl="0" eaLnBrk="1" fontAlgn="auto" latinLnBrk="0" hangingPunct="1">
+                        <a:lnSpc>
+                          <a:spcPct val="100000"/>
+                        </a:lnSpc>
+                        <a:spcBef>
+                          <a:spcPts val="0"/>
+                        </a:spcBef>
+                        <a:spcAft>
+                          <a:spcPts val="0"/>
+                        </a:spcAft>
+                        <a:buClrTx/>
+                        <a:buSzTx/>
+                        <a:buFontTx/>
+                        <a:buNone/>
+                        <a:tabLst/>
+                        <a:defRPr/>
+                      </a:pPr>
+                      <a:r>
+                        <a:rPr lang="en-IN" sz="1800" kern="1200" dirty="0">
+                          <a:solidFill>
+                            <a:schemeClr val="dk1"/>
+                          </a:solidFill>
+                          <a:effectLst/>
+                          <a:latin typeface="+mn-lt"/>
+                          <a:ea typeface="+mn-ea"/>
+                          <a:cs typeface="+mn-cs"/>
+                        </a:rPr>
+                        <a:t>@Controller</a:t>
+                      </a:r>
+                    </a:p>
+                    <a:p>
+                      <a:endParaRPr lang="en-IN" dirty="0"/>
+                    </a:p>
+                  </a:txBody>
+                  <a:tcPr/>
+                </a:tc>
+                <a:tc>
+                  <a:txBody>
+                    <a:bodyPr/>
+                    <a:lstStyle/>
+                    <a:p>
+                      <a:pPr marL="0" marR="0" lvl="0" indent="0" algn="l" defTabSz="457200" rtl="0" eaLnBrk="1" fontAlgn="auto" latinLnBrk="0" hangingPunct="1">
+                        <a:lnSpc>
+                          <a:spcPct val="100000"/>
+                        </a:lnSpc>
+                        <a:spcBef>
+                          <a:spcPts val="0"/>
+                        </a:spcBef>
+                        <a:spcAft>
+                          <a:spcPts val="0"/>
+                        </a:spcAft>
+                        <a:buClrTx/>
+                        <a:buSzTx/>
+                        <a:buFontTx/>
+                        <a:buNone/>
+                        <a:tabLst/>
+                        <a:defRPr/>
+                      </a:pPr>
+                      <a:r>
+                        <a:rPr lang="en-IN" sz="1600" kern="1200" dirty="0">
+                          <a:solidFill>
+                            <a:schemeClr val="dk1"/>
+                          </a:solidFill>
+                          <a:effectLst/>
+                          <a:latin typeface="+mn-lt"/>
+                          <a:ea typeface="+mn-ea"/>
+                          <a:cs typeface="+mn-cs"/>
+                        </a:rPr>
+                        <a:t>@Controller annotation indicates that a particular class serves the role of a controller. There is no need to extend any controller base class or reference the Servlet API.</a:t>
+                      </a:r>
+                    </a:p>
+                  </a:txBody>
+                  <a:tcPr/>
+                </a:tc>
+                <a:extLst>
+                  <a:ext uri="{0D108BD9-81ED-4DB2-BD59-A6C34878D82A}">
+                    <a16:rowId xmlns:a16="http://schemas.microsoft.com/office/drawing/2014/main" val="2966500544"/>
+                  </a:ext>
+                </a:extLst>
+              </a:tr>
+              <a:tr h="636886">
+                <a:tc>
+                  <a:txBody>
+                    <a:bodyPr/>
+                    <a:lstStyle/>
+                    <a:p>
+                      <a:pPr marL="0" marR="0" lvl="0" indent="0" algn="l" defTabSz="457200" rtl="0" eaLnBrk="1" fontAlgn="auto" latinLnBrk="0" hangingPunct="1">
+                        <a:lnSpc>
+                          <a:spcPct val="100000"/>
+                        </a:lnSpc>
+                        <a:spcBef>
+                          <a:spcPts val="0"/>
+                        </a:spcBef>
+                        <a:spcAft>
+                          <a:spcPts val="0"/>
+                        </a:spcAft>
+                        <a:buClrTx/>
+                        <a:buSzTx/>
+                        <a:buFontTx/>
+                        <a:buNone/>
+                        <a:tabLst/>
+                        <a:defRPr/>
+                      </a:pPr>
+                      <a:r>
+                        <a:rPr lang="en-IN" sz="1800" kern="1200" dirty="0">
+                          <a:solidFill>
+                            <a:schemeClr val="dk1"/>
+                          </a:solidFill>
+                          <a:effectLst/>
+                          <a:latin typeface="+mn-lt"/>
+                          <a:ea typeface="+mn-ea"/>
+                          <a:cs typeface="+mn-cs"/>
+                        </a:rPr>
+                        <a:t>@ModelAttriibute</a:t>
+                      </a:r>
+                    </a:p>
+                    <a:p>
+                      <a:endParaRPr lang="en-IN" dirty="0"/>
+                    </a:p>
+                  </a:txBody>
+                  <a:tcPr/>
+                </a:tc>
+                <a:tc>
+                  <a:txBody>
+                    <a:bodyPr/>
+                    <a:lstStyle/>
+                    <a:p>
+                      <a:pPr marL="0" marR="0" lvl="0" indent="0" algn="l" defTabSz="457200" rtl="0" eaLnBrk="1" fontAlgn="auto" latinLnBrk="0" hangingPunct="1">
+                        <a:lnSpc>
+                          <a:spcPct val="100000"/>
+                        </a:lnSpc>
+                        <a:spcBef>
+                          <a:spcPts val="0"/>
+                        </a:spcBef>
+                        <a:spcAft>
+                          <a:spcPts val="0"/>
+                        </a:spcAft>
+                        <a:buClrTx/>
+                        <a:buSzTx/>
+                        <a:buFontTx/>
+                        <a:buNone/>
+                        <a:tabLst/>
+                        <a:defRPr/>
+                      </a:pPr>
+                      <a:r>
+                        <a:rPr lang="en-IN" sz="1600" kern="1200" dirty="0">
+                          <a:solidFill>
+                            <a:schemeClr val="dk1"/>
+                          </a:solidFill>
+                          <a:effectLst/>
+                          <a:latin typeface="+mn-lt"/>
+                          <a:ea typeface="+mn-ea"/>
+                          <a:cs typeface="+mn-cs"/>
+                        </a:rPr>
+                        <a:t>It is an annotation that binds a method parameter or method return value to a named model attribute, and then exposes it to a web view</a:t>
+                      </a:r>
+                      <a:r>
+                        <a:rPr lang="en-IN" sz="1800" kern="1200" dirty="0">
+                          <a:solidFill>
+                            <a:schemeClr val="dk1"/>
+                          </a:solidFill>
+                          <a:effectLst/>
+                          <a:latin typeface="+mn-lt"/>
+                          <a:ea typeface="+mn-ea"/>
+                          <a:cs typeface="+mn-cs"/>
+                        </a:rPr>
+                        <a:t>.</a:t>
+                      </a:r>
+                    </a:p>
+                  </a:txBody>
+                  <a:tcPr/>
+                </a:tc>
+                <a:extLst>
+                  <a:ext uri="{0D108BD9-81ED-4DB2-BD59-A6C34878D82A}">
+                    <a16:rowId xmlns:a16="http://schemas.microsoft.com/office/drawing/2014/main" val="1273763011"/>
                   </a:ext>
                 </a:extLst>
               </a:tr>
@@ -7914,7 +8011,7 @@
     </p:spTree>
     <p:extLst>
       <p:ext uri="{BB962C8B-B14F-4D97-AF65-F5344CB8AC3E}">
-        <p14:creationId xmlns:p14="http://schemas.microsoft.com/office/powerpoint/2010/main" val="2996973014"/>
+        <p14:creationId xmlns:p14="http://schemas.microsoft.com/office/powerpoint/2010/main" val="2083830075"/>
       </p:ext>
     </p:extLst>
   </p:cSld>
@@ -7941,12 +8038,50 @@
           <a:chExt cx="0" cy="0"/>
         </a:xfrm>
       </p:grpSpPr>
+      <p:sp>
+        <p:nvSpPr>
+          <p:cNvPr id="2" name="Title 1">
+            <a:extLst>
+              <a:ext uri="{FF2B5EF4-FFF2-40B4-BE49-F238E27FC236}">
+                <a16:creationId xmlns:a16="http://schemas.microsoft.com/office/drawing/2014/main" id="{2BD5D572-E588-DCA2-000E-E7EFBDB4CFBC}"/>
+              </a:ext>
+            </a:extLst>
+          </p:cNvPr>
+          <p:cNvSpPr>
+            <a:spLocks noGrp="1"/>
+          </p:cNvSpPr>
+          <p:nvPr>
+            <p:ph type="title"/>
+          </p:nvPr>
+        </p:nvSpPr>
+        <p:spPr>
+          <a:xfrm>
+            <a:off x="677334" y="609600"/>
+            <a:ext cx="8596668" cy="1020417"/>
+          </a:xfrm>
+        </p:spPr>
+        <p:txBody>
+          <a:bodyPr/>
+          <a:lstStyle/>
+          <a:p>
+            <a:r>
+              <a:rPr lang="en-US" dirty="0"/>
+              <a:t>              </a:t>
+            </a:r>
+            <a:r>
+              <a:rPr lang="en-US" sz="4000" dirty="0"/>
+              <a:t>Spring Annotations</a:t>
+            </a:r>
+            <a:endParaRPr lang="en-IN" sz="4000" dirty="0"/>
+          </a:p>
+        </p:txBody>
+      </p:sp>
       <p:graphicFrame>
         <p:nvGraphicFramePr>
-          <p:cNvPr id="2" name="Table 2">
+          <p:cNvPr id="5" name="Table 5">
             <a:extLst>
               <a:ext uri="{FF2B5EF4-FFF2-40B4-BE49-F238E27FC236}">
-                <a16:creationId xmlns:a16="http://schemas.microsoft.com/office/drawing/2014/main" id="{FB79A2F0-2474-0B34-A882-ACE71938FFC0}"/>
+                <a16:creationId xmlns:a16="http://schemas.microsoft.com/office/drawing/2014/main" id="{6F45C215-168C-F0C9-65AC-048C290FA37E}"/>
               </a:ext>
             </a:extLst>
           </p:cNvPr>
@@ -7954,16 +8089,17 @@
             <a:graphicFrameLocks noGrp="1"/>
           </p:cNvGraphicFramePr>
           <p:nvPr>
+            <p:ph idx="1"/>
             <p:extLst>
               <p:ext uri="{D42A27DB-BD31-4B8C-83A1-F6EECF244321}">
-                <p14:modId xmlns:p14="http://schemas.microsoft.com/office/powerpoint/2010/main" val="1932596308"/>
+                <p14:modId xmlns:p14="http://schemas.microsoft.com/office/powerpoint/2010/main" val="1783116321"/>
               </p:ext>
             </p:extLst>
           </p:nvPr>
         </p:nvGraphicFramePr>
         <p:xfrm>
-          <a:off x="2032000" y="739301"/>
-          <a:ext cx="8128000" cy="4709160"/>
+          <a:off x="678807" y="1494846"/>
+          <a:ext cx="10152343" cy="4817668"/>
         </p:xfrm>
         <a:graphic>
           <a:graphicData uri="http://schemas.openxmlformats.org/drawingml/2006/table">
@@ -7972,28 +8108,28 @@
                 <a:tableStyleId>{5C22544A-7EE6-4342-B048-85BDC9FD1C3A}</a:tableStyleId>
               </a:tblPr>
               <a:tblGrid>
-                <a:gridCol w="2160621">
+                <a:gridCol w="2382843">
                   <a:extLst>
                     <a:ext uri="{9D8B030D-6E8A-4147-A177-3AD203B41FA5}">
-                      <a16:colId xmlns:a16="http://schemas.microsoft.com/office/drawing/2014/main" val="3853637559"/>
+                      <a16:colId xmlns:a16="http://schemas.microsoft.com/office/drawing/2014/main" val="2699845578"/>
                     </a:ext>
                   </a:extLst>
                 </a:gridCol>
-                <a:gridCol w="5967379">
+                <a:gridCol w="7769500">
                   <a:extLst>
                     <a:ext uri="{9D8B030D-6E8A-4147-A177-3AD203B41FA5}">
-                      <a16:colId xmlns:a16="http://schemas.microsoft.com/office/drawing/2014/main" val="512475761"/>
+                      <a16:colId xmlns:a16="http://schemas.microsoft.com/office/drawing/2014/main" val="1384232210"/>
                     </a:ext>
                   </a:extLst>
                 </a:gridCol>
               </a:tblGrid>
-              <a:tr h="363471">
+              <a:tr h="580948">
                 <a:tc>
                   <a:txBody>
                     <a:bodyPr/>
                     <a:lstStyle/>
                     <a:p>
-                      <a:endParaRPr lang="en-IN" dirty="0"/>
+                      <a:endParaRPr lang="en-IN"/>
                     </a:p>
                   </a:txBody>
                   <a:tcPr/>
@@ -8010,11 +8146,11 @@
                 </a:tc>
                 <a:extLst>
                   <a:ext uri="{0D108BD9-81ED-4DB2-BD59-A6C34878D82A}">
-                    <a16:rowId xmlns:a16="http://schemas.microsoft.com/office/drawing/2014/main" val="3934509563"/>
+                    <a16:rowId xmlns:a16="http://schemas.microsoft.com/office/drawing/2014/main" val="3779654022"/>
                   </a:ext>
                 </a:extLst>
               </a:tr>
-              <a:tr h="509730">
+              <a:tr h="558746">
                 <a:tc>
                   <a:txBody>
                     <a:bodyPr/>
@@ -8038,7 +8174,7 @@
                         <a:defRPr/>
                       </a:pPr>
                       <a:r>
-                        <a:rPr lang="en-IN" sz="1800" b="1" i="0" kern="1200" dirty="0">
+                        <a:rPr lang="en-IN" sz="1800" kern="1200" dirty="0">
                           <a:solidFill>
                             <a:schemeClr val="dk1"/>
                           </a:solidFill>
@@ -8047,68 +8183,12 @@
                           <a:ea typeface="+mn-ea"/>
                           <a:cs typeface="+mn-cs"/>
                         </a:rPr>
-                        <a:t>@Controller</a:t>
+                        <a:t>@ModelAttriibute</a:t>
                       </a:r>
-                    </a:p>
-                    <a:p>
-                      <a:endParaRPr lang="en-IN" dirty="0"/>
                     </a:p>
                   </a:txBody>
                   <a:tcPr/>
                 </a:tc>
-                <a:tc>
-                  <a:txBody>
-                    <a:bodyPr/>
-                    <a:lstStyle/>
-                    <a:p>
-                      <a:r>
-                        <a:rPr lang="en-IN" sz="1800" b="0" i="0" kern="1200" dirty="0">
-                          <a:solidFill>
-                            <a:schemeClr val="dk1"/>
-                          </a:solidFill>
-                          <a:effectLst/>
-                          <a:latin typeface="+mn-lt"/>
-                          <a:ea typeface="+mn-ea"/>
-                          <a:cs typeface="+mn-cs"/>
-                        </a:rPr>
-                        <a:t>import </a:t>
-                      </a:r>
-                      <a:r>
-                        <a:rPr lang="en-IN" sz="1800" b="0" i="0" kern="1200" dirty="0" err="1">
-                          <a:solidFill>
-                            <a:schemeClr val="dk1"/>
-                          </a:solidFill>
-                          <a:effectLst/>
-                          <a:latin typeface="+mn-lt"/>
-                          <a:ea typeface="+mn-ea"/>
-                          <a:cs typeface="+mn-cs"/>
-                        </a:rPr>
-                        <a:t>org.springframework.stereotype.Controller</a:t>
-                      </a:r>
-                      <a:r>
-                        <a:rPr lang="en-IN" sz="1800" b="0" i="0" kern="1200" dirty="0">
-                          <a:solidFill>
-                            <a:schemeClr val="dk1"/>
-                          </a:solidFill>
-                          <a:effectLst/>
-                          <a:latin typeface="+mn-lt"/>
-                          <a:ea typeface="+mn-ea"/>
-                          <a:cs typeface="+mn-cs"/>
-                        </a:rPr>
-                        <a:t>;</a:t>
-                      </a:r>
-                      <a:endParaRPr lang="en-IN" dirty="0"/>
-                    </a:p>
-                  </a:txBody>
-                  <a:tcPr/>
-                </a:tc>
-                <a:extLst>
-                  <a:ext uri="{0D108BD9-81ED-4DB2-BD59-A6C34878D82A}">
-                    <a16:rowId xmlns:a16="http://schemas.microsoft.com/office/drawing/2014/main" val="1842747870"/>
-                  </a:ext>
-                </a:extLst>
-              </a:tr>
-              <a:tr h="363471">
                 <a:tc>
                   <a:txBody>
                     <a:bodyPr/>
@@ -8132,7 +8212,7 @@
                         <a:defRPr/>
                       </a:pPr>
                       <a:r>
-                        <a:rPr lang="en-IN" sz="1800" b="1" i="0" kern="1200" dirty="0">
+                        <a:rPr lang="en-IN" sz="1600" kern="1200" dirty="0">
                           <a:solidFill>
                             <a:schemeClr val="dk1"/>
                           </a:solidFill>
@@ -8141,39 +8221,19 @@
                           <a:ea typeface="+mn-ea"/>
                           <a:cs typeface="+mn-cs"/>
                         </a:rPr>
-                        <a:t>@RequestMapping</a:t>
+                        <a:t>It is an annotation that binds a method parameter or method return value to a named model attribute, and then exposes it to a web view.</a:t>
                       </a:r>
-                    </a:p>
-                    <a:p>
-                      <a:endParaRPr lang="en-IN" dirty="0"/>
                     </a:p>
                   </a:txBody>
                   <a:tcPr/>
                 </a:tc>
-                <a:tc>
-                  <a:txBody>
-                    <a:bodyPr/>
-                    <a:lstStyle/>
-                    <a:p>
-                      <a:br>
-                        <a:rPr lang="en-IN" dirty="0"/>
-                      </a:br>
-                      <a:r>
-                        <a:rPr lang="en-IN" dirty="0" err="1"/>
-                        <a:t>importorg.springframework.web.bind.annotation.RequestMapping</a:t>
-                      </a:r>
-                      <a:endParaRPr lang="en-IN" dirty="0"/>
-                    </a:p>
-                  </a:txBody>
-                  <a:tcPr marL="22860" marR="22860" marT="22860" marB="22860" anchor="ctr"/>
-                </a:tc>
                 <a:extLst>
                   <a:ext uri="{0D108BD9-81ED-4DB2-BD59-A6C34878D82A}">
-                    <a16:rowId xmlns:a16="http://schemas.microsoft.com/office/drawing/2014/main" val="2285032300"/>
+                    <a16:rowId xmlns:a16="http://schemas.microsoft.com/office/drawing/2014/main" val="818558974"/>
                   </a:ext>
                 </a:extLst>
               </a:tr>
-              <a:tr h="363471">
+              <a:tr h="617561">
                 <a:tc>
                   <a:txBody>
                     <a:bodyPr/>
@@ -8197,7 +8257,7 @@
                         <a:defRPr/>
                       </a:pPr>
                       <a:r>
-                        <a:rPr lang="en-IN" sz="1800" b="1" i="0" kern="1200" dirty="0">
+                        <a:rPr lang="en-IN" sz="1800" kern="1200" dirty="0">
                           <a:solidFill>
                             <a:schemeClr val="dk1"/>
                           </a:solidFill>
@@ -8206,7 +8266,7 @@
                           <a:ea typeface="+mn-ea"/>
                           <a:cs typeface="+mn-cs"/>
                         </a:rPr>
-                        <a:t>@PathVariable</a:t>
+                        <a:t>@RequestMapping</a:t>
                       </a:r>
                     </a:p>
                     <a:p>
@@ -8215,47 +8275,6 @@
                   </a:txBody>
                   <a:tcPr/>
                 </a:tc>
-                <a:tc>
-                  <a:txBody>
-                    <a:bodyPr/>
-                    <a:lstStyle/>
-                    <a:p>
-                      <a:r>
-                        <a:rPr lang="en-IN" sz="1800" b="0" i="0" kern="1200" dirty="0" err="1">
-                          <a:solidFill>
-                            <a:schemeClr val="dk1"/>
-                          </a:solidFill>
-                          <a:effectLst/>
-                          <a:latin typeface="+mn-lt"/>
-                          <a:ea typeface="+mn-ea"/>
-                          <a:cs typeface="+mn-cs"/>
-                        </a:rPr>
-                        <a:t>importorg.springframework.web.bind.annotation.PathVariable</a:t>
-                      </a:r>
-                      <a:r>
-                        <a:rPr lang="en-IN" sz="1800" b="0" i="0" kern="1200" dirty="0">
-                          <a:solidFill>
-                            <a:schemeClr val="dk1"/>
-                          </a:solidFill>
-                          <a:effectLst/>
-                          <a:latin typeface="+mn-lt"/>
-                          <a:ea typeface="+mn-ea"/>
-                          <a:cs typeface="+mn-cs"/>
-                        </a:rPr>
-                        <a:t>;</a:t>
-                      </a:r>
-                      <a:endParaRPr lang="en-IN" dirty="0"/>
-                    </a:p>
-                  </a:txBody>
-                  <a:tcPr/>
-                </a:tc>
-                <a:extLst>
-                  <a:ext uri="{0D108BD9-81ED-4DB2-BD59-A6C34878D82A}">
-                    <a16:rowId xmlns:a16="http://schemas.microsoft.com/office/drawing/2014/main" val="4061335151"/>
-                  </a:ext>
-                </a:extLst>
-              </a:tr>
-              <a:tr h="363471">
                 <a:tc>
                   <a:txBody>
                     <a:bodyPr/>
@@ -8279,7 +8298,7 @@
                         <a:defRPr/>
                       </a:pPr>
                       <a:r>
-                        <a:rPr lang="en-IN" sz="1800" b="1" i="0" kern="1200" dirty="0">
+                        <a:rPr lang="en-IN" sz="1800" kern="1200" dirty="0">
                           <a:solidFill>
                             <a:schemeClr val="dk1"/>
                           </a:solidFill>
@@ -8288,10 +8307,28 @@
                           <a:ea typeface="+mn-ea"/>
                           <a:cs typeface="+mn-cs"/>
                         </a:rPr>
-                        <a:t>@RequestParam</a:t>
+                        <a:t>The @RequestMapping annotation can be applied to class-level and/or method-level in a controller.</a:t>
                       </a:r>
                     </a:p>
+                  </a:txBody>
+                  <a:tcPr/>
+                </a:tc>
+                <a:extLst>
+                  <a:ext uri="{0D108BD9-81ED-4DB2-BD59-A6C34878D82A}">
+                    <a16:rowId xmlns:a16="http://schemas.microsoft.com/office/drawing/2014/main" val="2398373978"/>
+                  </a:ext>
+                </a:extLst>
+              </a:tr>
+              <a:tr h="617561">
+                <a:tc>
+                  <a:txBody>
+                    <a:bodyPr/>
+                    <a:lstStyle/>
                     <a:p>
+                      <a:r>
+                        <a:rPr lang="en-US" dirty="0"/>
+                        <a:t>@Autowired </a:t>
+                      </a:r>
                       <a:endParaRPr lang="en-IN" dirty="0"/>
                     </a:p>
                   </a:txBody>
@@ -8303,28 +8340,8 @@
                     <a:lstStyle/>
                     <a:p>
                       <a:r>
-                        <a:rPr lang="en-IN" sz="1800" b="0" i="0" kern="1200" dirty="0" err="1">
-                          <a:solidFill>
-                            <a:schemeClr val="dk1"/>
-                          </a:solidFill>
-                          <a:effectLst/>
-                          <a:latin typeface="+mn-lt"/>
-                          <a:ea typeface="+mn-ea"/>
-                          <a:cs typeface="+mn-cs"/>
-                        </a:rPr>
-                        <a:t>importorg.springframework.web.bind.annotation.RequestParam</a:t>
-                      </a:r>
-                      <a:r>
-                        <a:rPr lang="en-IN" sz="1800" b="0" i="0" kern="1200" dirty="0">
-                          <a:solidFill>
-                            <a:schemeClr val="dk1"/>
-                          </a:solidFill>
-                          <a:effectLst/>
-                          <a:latin typeface="+mn-lt"/>
-                          <a:ea typeface="+mn-ea"/>
-                          <a:cs typeface="+mn-cs"/>
-                        </a:rPr>
-                        <a:t>;</a:t>
+                        <a:rPr lang="en-US" dirty="0"/>
+                        <a:t>The annotation @Autowired helps to auto wire the collaborative beans in spring boot framework.</a:t>
                       </a:r>
                       <a:endParaRPr lang="en-IN" dirty="0"/>
                     </a:p>
@@ -8333,47 +8350,20 @@
                 </a:tc>
                 <a:extLst>
                   <a:ext uri="{0D108BD9-81ED-4DB2-BD59-A6C34878D82A}">
-                    <a16:rowId xmlns:a16="http://schemas.microsoft.com/office/drawing/2014/main" val="1726214234"/>
+                    <a16:rowId xmlns:a16="http://schemas.microsoft.com/office/drawing/2014/main" val="2088378083"/>
                   </a:ext>
                 </a:extLst>
               </a:tr>
-              <a:tr h="363471">
+              <a:tr h="617561">
                 <a:tc>
                   <a:txBody>
                     <a:bodyPr/>
                     <a:lstStyle/>
                     <a:p>
-                      <a:pPr marL="0" marR="0" lvl="0" indent="0" algn="l" defTabSz="457200" rtl="0" eaLnBrk="1" fontAlgn="auto" latinLnBrk="0" hangingPunct="1">
-                        <a:lnSpc>
-                          <a:spcPct val="100000"/>
-                        </a:lnSpc>
-                        <a:spcBef>
-                          <a:spcPts val="0"/>
-                        </a:spcBef>
-                        <a:spcAft>
-                          <a:spcPts val="0"/>
-                        </a:spcAft>
-                        <a:buClrTx/>
-                        <a:buSzTx/>
-                        <a:buFontTx/>
-                        <a:buNone/>
-                        <a:tabLst/>
-                        <a:defRPr/>
-                      </a:pPr>
                       <a:r>
-                        <a:rPr lang="en-IN" sz="1800" b="1" i="0" kern="1200" dirty="0">
-                          <a:solidFill>
-                            <a:schemeClr val="dk1"/>
-                          </a:solidFill>
-                          <a:effectLst/>
-                          <a:latin typeface="+mn-lt"/>
-                          <a:ea typeface="+mn-ea"/>
-                          <a:cs typeface="+mn-cs"/>
-                        </a:rPr>
-                        <a:t>@ModelAttribute</a:t>
+                        <a:rPr lang="en-US" dirty="0"/>
+                        <a:t>@GetMapping</a:t>
                       </a:r>
-                    </a:p>
-                    <a:p>
                       <a:endParaRPr lang="en-IN" dirty="0"/>
                     </a:p>
                   </a:txBody>
@@ -8385,16 +8375,8 @@
                     <a:lstStyle/>
                     <a:p>
                       <a:r>
-                        <a:rPr lang="en-IN" sz="1800" b="0" i="0" kern="1200" dirty="0" err="1">
-                          <a:solidFill>
-                            <a:schemeClr val="dk1"/>
-                          </a:solidFill>
-                          <a:effectLst/>
-                          <a:latin typeface="+mn-lt"/>
-                          <a:ea typeface="+mn-ea"/>
-                          <a:cs typeface="+mn-cs"/>
-                        </a:rPr>
-                        <a:t>importorg.springframework.web.bind.annotation.ModelAttribute</a:t>
+                        <a:rPr lang="en-US" dirty="0"/>
+                        <a:t>This annotation is used for mapping HTTP GET requests onto specific handler methods</a:t>
                       </a:r>
                       <a:endParaRPr lang="en-IN" dirty="0"/>
                     </a:p>
@@ -8403,47 +8385,20 @@
                 </a:tc>
                 <a:extLst>
                   <a:ext uri="{0D108BD9-81ED-4DB2-BD59-A6C34878D82A}">
-                    <a16:rowId xmlns:a16="http://schemas.microsoft.com/office/drawing/2014/main" val="1176314897"/>
+                    <a16:rowId xmlns:a16="http://schemas.microsoft.com/office/drawing/2014/main" val="1787670863"/>
                   </a:ext>
                 </a:extLst>
               </a:tr>
-              <a:tr h="363471">
+              <a:tr h="357793">
                 <a:tc>
                   <a:txBody>
                     <a:bodyPr/>
                     <a:lstStyle/>
                     <a:p>
-                      <a:pPr marL="0" marR="0" lvl="0" indent="0" algn="l" defTabSz="457200" rtl="0" eaLnBrk="1" fontAlgn="auto" latinLnBrk="0" hangingPunct="1">
-                        <a:lnSpc>
-                          <a:spcPct val="100000"/>
-                        </a:lnSpc>
-                        <a:spcBef>
-                          <a:spcPts val="0"/>
-                        </a:spcBef>
-                        <a:spcAft>
-                          <a:spcPts val="0"/>
-                        </a:spcAft>
-                        <a:buClrTx/>
-                        <a:buSzTx/>
-                        <a:buFontTx/>
-                        <a:buNone/>
-                        <a:tabLst/>
-                        <a:defRPr/>
-                      </a:pPr>
                       <a:r>
-                        <a:rPr lang="en-IN" sz="1800" b="1" i="0" kern="1200" dirty="0">
-                          <a:solidFill>
-                            <a:schemeClr val="dk1"/>
-                          </a:solidFill>
-                          <a:effectLst/>
-                          <a:latin typeface="+mn-lt"/>
-                          <a:ea typeface="+mn-ea"/>
-                          <a:cs typeface="+mn-cs"/>
-                        </a:rPr>
-                        <a:t>@SessionAttributes</a:t>
+                        <a:rPr lang="en-US" dirty="0"/>
+                        <a:t>@Setter</a:t>
                       </a:r>
-                    </a:p>
-                    <a:p>
                       <a:endParaRPr lang="en-IN" dirty="0"/>
                     </a:p>
                   </a:txBody>
@@ -8455,16 +8410,114 @@
                     <a:lstStyle/>
                     <a:p>
                       <a:r>
-                        <a:rPr lang="en-IN" dirty="0"/>
-                        <a:t>importorg.springframework.web.bind.annotation.SessionAttributes;</a:t>
+                        <a:rPr lang="en-US" dirty="0"/>
+                        <a:t>This annotation is used update the value of a variable.</a:t>
                       </a:r>
+                      <a:endParaRPr lang="en-IN" dirty="0"/>
                     </a:p>
                   </a:txBody>
-                  <a:tcPr marL="22860" marR="22860" marT="22860" marB="22860" anchor="ctr"/>
+                  <a:tcPr/>
                 </a:tc>
                 <a:extLst>
                   <a:ext uri="{0D108BD9-81ED-4DB2-BD59-A6C34878D82A}">
-                    <a16:rowId xmlns:a16="http://schemas.microsoft.com/office/drawing/2014/main" val="3898199199"/>
+                    <a16:rowId xmlns:a16="http://schemas.microsoft.com/office/drawing/2014/main" val="1686543065"/>
+                  </a:ext>
+                </a:extLst>
+              </a:tr>
+              <a:tr h="357793">
+                <a:tc>
+                  <a:txBody>
+                    <a:bodyPr/>
+                    <a:lstStyle/>
+                    <a:p>
+                      <a:r>
+                        <a:rPr lang="en-US" dirty="0"/>
+                        <a:t>@Getter</a:t>
+                      </a:r>
+                      <a:endParaRPr lang="en-IN" dirty="0"/>
+                    </a:p>
+                  </a:txBody>
+                  <a:tcPr/>
+                </a:tc>
+                <a:tc>
+                  <a:txBody>
+                    <a:bodyPr/>
+                    <a:lstStyle/>
+                    <a:p>
+                      <a:r>
+                        <a:rPr lang="en-US" dirty="0"/>
+                        <a:t>This annotation is used to read the value of a variable</a:t>
+                      </a:r>
+                      <a:endParaRPr lang="en-IN" dirty="0"/>
+                    </a:p>
+                  </a:txBody>
+                  <a:tcPr/>
+                </a:tc>
+                <a:extLst>
+                  <a:ext uri="{0D108BD9-81ED-4DB2-BD59-A6C34878D82A}">
+                    <a16:rowId xmlns:a16="http://schemas.microsoft.com/office/drawing/2014/main" val="1822316256"/>
+                  </a:ext>
+                </a:extLst>
+              </a:tr>
+              <a:tr h="617561">
+                <a:tc>
+                  <a:txBody>
+                    <a:bodyPr/>
+                    <a:lstStyle/>
+                    <a:p>
+                      <a:r>
+                        <a:rPr lang="en-US" dirty="0"/>
+                        <a:t>@Tostring</a:t>
+                      </a:r>
+                      <a:endParaRPr lang="en-IN" dirty="0"/>
+                    </a:p>
+                  </a:txBody>
+                  <a:tcPr/>
+                </a:tc>
+                <a:tc>
+                  <a:txBody>
+                    <a:bodyPr/>
+                    <a:lstStyle/>
+                    <a:p>
+                      <a:r>
+                        <a:rPr lang="en-US" dirty="0"/>
+                        <a:t>This annotation modifies the generated bytecode and creates an implementation of the toString()method.</a:t>
+                      </a:r>
+                      <a:endParaRPr lang="en-IN" dirty="0"/>
+                    </a:p>
+                  </a:txBody>
+                  <a:tcPr/>
+                </a:tc>
+                <a:extLst>
+                  <a:ext uri="{0D108BD9-81ED-4DB2-BD59-A6C34878D82A}">
+                    <a16:rowId xmlns:a16="http://schemas.microsoft.com/office/drawing/2014/main" val="4001422909"/>
+                  </a:ext>
+                </a:extLst>
+              </a:tr>
+              <a:tr h="357793">
+                <a:tc>
+                  <a:txBody>
+                    <a:bodyPr/>
+                    <a:lstStyle/>
+                    <a:p>
+                      <a:endParaRPr lang="en-IN"/>
+                    </a:p>
+                  </a:txBody>
+                  <a:tcPr/>
+                </a:tc>
+                <a:tc>
+                  <a:txBody>
+                    <a:bodyPr/>
+                    <a:lstStyle/>
+                    <a:p>
+                      <a:endParaRPr lang="en-IN" dirty="0"/>
+                    </a:p>
+                  </a:txBody>
+                  <a:tcPr/>
+                </a:tc>
+                <a:extLst>
+                  <a:ext uri="{0D108BD9-81ED-4DB2-BD59-A6C34878D82A}">
+                    <a16:rowId xmlns:a16="http://schemas.microsoft.com/office/drawing/2014/main" val="325637552"/>
                   </a:ext>
                 </a:extLst>
               </a:tr>
@@ -8475,7 +8528,7 @@
     </p:spTree>
     <p:extLst>
       <p:ext uri="{BB962C8B-B14F-4D97-AF65-F5344CB8AC3E}">
-        <p14:creationId xmlns:p14="http://schemas.microsoft.com/office/powerpoint/2010/main" val="1052553867"/>
+        <p14:creationId xmlns:p14="http://schemas.microsoft.com/office/powerpoint/2010/main" val="739087321"/>
       </p:ext>
     </p:extLst>
   </p:cSld>
@@ -8504,10 +8557,10 @@
       </p:grpSpPr>
       <p:sp>
         <p:nvSpPr>
-          <p:cNvPr id="2" name="Title 1">
+          <p:cNvPr id="7" name="Title 6">
             <a:extLst>
               <a:ext uri="{FF2B5EF4-FFF2-40B4-BE49-F238E27FC236}">
-                <a16:creationId xmlns:a16="http://schemas.microsoft.com/office/drawing/2014/main" id="{961C5F60-1731-5F2F-EED1-D4378D6409C5}"/>
+                <a16:creationId xmlns:a16="http://schemas.microsoft.com/office/drawing/2014/main" id="{760879E2-9C3E-CB9E-9CD7-22010B4707A9}"/>
               </a:ext>
             </a:extLst>
           </p:cNvPr>
@@ -8525,7 +8578,7 @@
           <a:p>
             <a:r>
               <a:rPr lang="en-IN" dirty="0"/>
-              <a:t>                         </a:t>
+              <a:t>                     </a:t>
             </a:r>
             <a:r>
               <a:rPr lang="en-IN" dirty="0">
@@ -8533,17 +8586,17 @@
                   <a:schemeClr val="accent4"/>
                 </a:solidFill>
               </a:rPr>
-              <a:t>Backend</a:t>
-            </a:r>
-          </a:p>
-        </p:txBody>
-      </p:sp>
-      <p:sp>
-        <p:nvSpPr>
-          <p:cNvPr id="3" name="Content Placeholder 2">
+              <a:t>CONCLUSION</a:t>
+            </a:r>
+          </a:p>
+        </p:txBody>
+      </p:sp>
+      <p:sp>
+        <p:nvSpPr>
+          <p:cNvPr id="8" name="Content Placeholder 7">
             <a:extLst>
               <a:ext uri="{FF2B5EF4-FFF2-40B4-BE49-F238E27FC236}">
-                <a16:creationId xmlns:a16="http://schemas.microsoft.com/office/drawing/2014/main" id="{FB38989A-145D-EFA1-8CBC-90DDC05969BA}"/>
+                <a16:creationId xmlns:a16="http://schemas.microsoft.com/office/drawing/2014/main" id="{DBE1DDA2-209C-80CB-980F-486285E22E97}"/>
               </a:ext>
             </a:extLst>
           </p:cNvPr>
@@ -8556,480 +8609,194 @@
         </p:nvSpPr>
         <p:spPr>
           <a:xfrm>
-            <a:off x="677334" y="2169267"/>
-            <a:ext cx="8596668" cy="3803515"/>
+            <a:off x="677334" y="1447137"/>
+            <a:ext cx="9015306" cy="5096786"/>
           </a:xfrm>
         </p:spPr>
         <p:txBody>
           <a:bodyPr>
-            <a:normAutofit fontScale="25000" lnSpcReduction="20000"/>
+            <a:normAutofit fontScale="77500" lnSpcReduction="20000"/>
           </a:bodyPr>
           <a:lstStyle/>
           <a:p>
-            <a:r>
-              <a:rPr lang="en-IN" sz="5600" b="1" i="0" dirty="0">
-                <a:solidFill>
-                  <a:srgbClr val="000000"/>
-                </a:solidFill>
+            <a:pPr algn="just">
+              <a:lnSpc>
+                <a:spcPct val="150000"/>
+              </a:lnSpc>
+              <a:spcAft>
+                <a:spcPts val="1000"/>
+              </a:spcAft>
+            </a:pPr>
+            <a:r>
+              <a:rPr lang="en-US" sz="1900" dirty="0">
                 <a:effectLst/>
-                <a:latin typeface="Arial" panose="020B0604020202020204" pitchFamily="34" charset="0"/>
-              </a:rPr>
-              <a:t>@Service</a:t>
-            </a:r>
-          </a:p>
-          <a:p>
-            <a:pPr marL="0" indent="0">
-              <a:buNone/>
-            </a:pPr>
-            <a:r>
-              <a:rPr lang="en-IN" sz="5600" b="1" dirty="0">
-                <a:solidFill>
-                  <a:srgbClr val="000000"/>
-                </a:solidFill>
-                <a:latin typeface="Arial" panose="020B0604020202020204" pitchFamily="34" charset="0"/>
-              </a:rPr>
-              <a:t>      </a:t>
-            </a:r>
-            <a:r>
-              <a:rPr lang="en-US" sz="5600" b="0" i="0" dirty="0">
-                <a:solidFill>
-                  <a:srgbClr val="000000"/>
-                </a:solidFill>
-                <a:effectLst/>
-                <a:latin typeface="Arial" panose="020B0604020202020204" pitchFamily="34" charset="0"/>
-              </a:rPr>
-              <a:t>Annotate all your service classes with @Service. All your business logic should be in Service classes.</a:t>
-            </a:r>
-          </a:p>
-          <a:p>
-            <a:pPr marL="0" indent="0">
-              <a:buNone/>
-            </a:pPr>
-            <a:r>
-              <a:rPr lang="en-US" sz="5600" dirty="0">
-                <a:solidFill>
-                  <a:srgbClr val="000000"/>
-                </a:solidFill>
-                <a:latin typeface="Arial" panose="020B0604020202020204" pitchFamily="34" charset="0"/>
-              </a:rPr>
-              <a:t>  @Service</a:t>
-            </a:r>
-          </a:p>
-          <a:p>
-            <a:pPr marL="0" indent="0">
-              <a:buNone/>
-            </a:pPr>
-            <a:r>
-              <a:rPr lang="en-US" sz="5600" b="0" i="0" dirty="0">
-                <a:solidFill>
-                  <a:srgbClr val="000000"/>
-                </a:solidFill>
-                <a:effectLst/>
-                <a:latin typeface="Arial" panose="020B0604020202020204" pitchFamily="34" charset="0"/>
-              </a:rPr>
-              <a:t>     public class </a:t>
-            </a:r>
-            <a:r>
-              <a:rPr lang="en-US" sz="5600" b="0" i="0" dirty="0" err="1">
-                <a:solidFill>
-                  <a:srgbClr val="000000"/>
-                </a:solidFill>
-                <a:effectLst/>
-                <a:latin typeface="Arial" panose="020B0604020202020204" pitchFamily="34" charset="0"/>
-              </a:rPr>
-              <a:t>CompanyServiceImpl</a:t>
-            </a:r>
-            <a:r>
-              <a:rPr lang="en-US" sz="5600" b="0" i="0" dirty="0">
-                <a:solidFill>
-                  <a:srgbClr val="000000"/>
-                </a:solidFill>
-                <a:effectLst/>
-                <a:latin typeface="Arial" panose="020B0604020202020204" pitchFamily="34" charset="0"/>
-              </a:rPr>
-              <a:t> implements </a:t>
-            </a:r>
-            <a:r>
-              <a:rPr lang="en-US" sz="5600" b="0" i="0" dirty="0" err="1">
-                <a:solidFill>
-                  <a:srgbClr val="000000"/>
-                </a:solidFill>
-                <a:effectLst/>
-                <a:latin typeface="Arial" panose="020B0604020202020204" pitchFamily="34" charset="0"/>
-              </a:rPr>
-              <a:t>Company</a:t>
-            </a:r>
-            <a:r>
-              <a:rPr lang="en-US" sz="5600" dirty="0" err="1">
-                <a:solidFill>
-                  <a:srgbClr val="000000"/>
-                </a:solidFill>
-                <a:latin typeface="Arial" panose="020B0604020202020204" pitchFamily="34" charset="0"/>
-              </a:rPr>
-              <a:t>Service</a:t>
-            </a:r>
-            <a:r>
-              <a:rPr lang="en-US" sz="5600" dirty="0">
-                <a:solidFill>
-                  <a:srgbClr val="000000"/>
-                </a:solidFill>
-                <a:latin typeface="Arial" panose="020B0604020202020204" pitchFamily="34" charset="0"/>
-              </a:rPr>
-              <a:t> {</a:t>
-            </a:r>
-          </a:p>
-          <a:p>
-            <a:pPr marL="0" indent="0">
-              <a:buNone/>
-            </a:pPr>
-            <a:r>
-              <a:rPr lang="en-US" sz="5600" b="0" i="0" dirty="0">
-                <a:solidFill>
-                  <a:srgbClr val="000000"/>
-                </a:solidFill>
-                <a:effectLst/>
-                <a:latin typeface="Arial" panose="020B0604020202020204" pitchFamily="34" charset="0"/>
-              </a:rPr>
-              <a:t>     ……</a:t>
-            </a:r>
-          </a:p>
-          <a:p>
-            <a:pPr marL="0" indent="0">
-              <a:buNone/>
-            </a:pPr>
-            <a:r>
-              <a:rPr lang="en-US" sz="5600" dirty="0">
-                <a:solidFill>
-                  <a:srgbClr val="000000"/>
-                </a:solidFill>
-                <a:latin typeface="Arial" panose="020B0604020202020204" pitchFamily="34" charset="0"/>
-              </a:rPr>
-              <a:t>     }</a:t>
-            </a:r>
-          </a:p>
-          <a:p>
-            <a:r>
-              <a:rPr lang="en-US" sz="5600" b="1" dirty="0">
-                <a:solidFill>
-                  <a:srgbClr val="000000"/>
-                </a:solidFill>
-                <a:latin typeface="Arial" panose="020B0604020202020204" pitchFamily="34" charset="0"/>
-              </a:rPr>
-              <a:t>@ Repository</a:t>
-            </a:r>
-          </a:p>
-          <a:p>
-            <a:pPr marL="0" indent="0">
-              <a:buNone/>
-            </a:pPr>
-            <a:r>
-              <a:rPr lang="en-US" sz="5600" b="0" i="0" dirty="0">
-                <a:solidFill>
-                  <a:srgbClr val="000000"/>
-                </a:solidFill>
-                <a:effectLst/>
-                <a:latin typeface="Arial" panose="020B0604020202020204" pitchFamily="34" charset="0"/>
-              </a:rPr>
-              <a:t>   Annotate all your DAO classes with @Repository. All your database access logic     should be in DAO classes.</a:t>
-            </a:r>
-          </a:p>
-          <a:p>
-            <a:pPr marL="0" indent="0">
-              <a:buNone/>
-            </a:pPr>
-            <a:r>
-              <a:rPr lang="en-US" sz="5600" b="0" i="0" dirty="0">
-                <a:solidFill>
-                  <a:srgbClr val="000000"/>
-                </a:solidFill>
-                <a:effectLst/>
-                <a:latin typeface="Arial" panose="020B0604020202020204" pitchFamily="34" charset="0"/>
-              </a:rPr>
-              <a:t>@Repository</a:t>
-            </a:r>
-          </a:p>
-          <a:p>
-            <a:pPr marL="0" indent="0">
-              <a:buNone/>
-            </a:pPr>
-            <a:r>
-              <a:rPr kumimoji="0" lang="en-US" altLang="en-US" sz="5600" b="0" i="0" u="none" strike="noStrike" cap="none" normalizeH="0" baseline="0" dirty="0">
-                <a:ln>
-                  <a:noFill/>
-                </a:ln>
-                <a:solidFill>
-                  <a:srgbClr val="000000"/>
-                </a:solidFill>
-                <a:effectLst/>
-                <a:latin typeface="Arial Unicode MS"/>
-              </a:rPr>
-              <a:t>public class </a:t>
-            </a:r>
-            <a:r>
-              <a:rPr kumimoji="0" lang="en-US" altLang="en-US" sz="5600" b="0" i="0" u="none" strike="noStrike" cap="none" normalizeH="0" baseline="0" dirty="0" err="1">
-                <a:ln>
-                  <a:noFill/>
-                </a:ln>
-                <a:solidFill>
-                  <a:srgbClr val="000000"/>
-                </a:solidFill>
-                <a:effectLst/>
-                <a:latin typeface="Arial Unicode MS"/>
-              </a:rPr>
-              <a:t>CompanyDAOImpl</a:t>
-            </a:r>
-            <a:r>
-              <a:rPr kumimoji="0" lang="en-US" altLang="en-US" sz="5600" b="0" i="0" u="none" strike="noStrike" cap="none" normalizeH="0" baseline="0" dirty="0">
-                <a:ln>
-                  <a:noFill/>
-                </a:ln>
-                <a:solidFill>
-                  <a:srgbClr val="000000"/>
-                </a:solidFill>
-                <a:effectLst/>
-                <a:latin typeface="Arial Unicode MS"/>
-              </a:rPr>
-              <a:t> implements </a:t>
-            </a:r>
-            <a:r>
-              <a:rPr kumimoji="0" lang="en-US" altLang="en-US" sz="5600" b="0" i="0" u="none" strike="noStrike" cap="none" normalizeH="0" baseline="0" dirty="0" err="1">
-                <a:ln>
-                  <a:noFill/>
-                </a:ln>
-                <a:solidFill>
-                  <a:srgbClr val="000000"/>
-                </a:solidFill>
-                <a:effectLst/>
-                <a:latin typeface="Arial Unicode MS"/>
-              </a:rPr>
-              <a:t>CompanyDAO</a:t>
-            </a:r>
-            <a:r>
-              <a:rPr kumimoji="0" lang="en-US" altLang="en-US" sz="5600" b="0" i="0" u="none" strike="noStrike" cap="none" normalizeH="0" baseline="0" dirty="0">
-                <a:ln>
-                  <a:noFill/>
-                </a:ln>
-                <a:solidFill>
-                  <a:srgbClr val="000000"/>
-                </a:solidFill>
-                <a:effectLst/>
-                <a:latin typeface="Arial Unicode MS"/>
-              </a:rPr>
-              <a:t> {</a:t>
-            </a:r>
-            <a:r>
-              <a:rPr kumimoji="0" lang="en-US" altLang="en-US" sz="5600" b="0" i="0" u="none" strike="noStrike" cap="none" normalizeH="0" baseline="0" dirty="0">
-                <a:ln>
-                  <a:noFill/>
-                </a:ln>
-                <a:solidFill>
-                  <a:schemeClr val="tx1"/>
-                </a:solidFill>
-                <a:effectLst/>
+                <a:latin typeface="Times New Roman" panose="02020603050405020304" pitchFamily="18" charset="0"/>
+                <a:ea typeface="Times New Roman" panose="02020603050405020304" pitchFamily="18" charset="0"/>
+                <a:cs typeface="Times New Roman" panose="02020603050405020304" pitchFamily="18" charset="0"/>
               </a:rPr>
               <a:t> </a:t>
             </a:r>
-            <a:endParaRPr kumimoji="0" lang="en-US" altLang="en-US" sz="5600" b="0" i="0" u="none" strike="noStrike" cap="none" normalizeH="0" baseline="0" dirty="0">
-              <a:ln>
-                <a:noFill/>
-              </a:ln>
-              <a:solidFill>
-                <a:schemeClr val="tx1"/>
-              </a:solidFill>
+            <a:r>
+              <a:rPr lang="en-US" sz="2300" dirty="0">
+                <a:effectLst/>
+                <a:latin typeface="Times New Roman" panose="02020603050405020304" pitchFamily="18" charset="0"/>
+                <a:ea typeface="Times New Roman" panose="02020603050405020304" pitchFamily="18" charset="0"/>
+                <a:cs typeface="Times New Roman" panose="02020603050405020304" pitchFamily="18" charset="0"/>
+              </a:rPr>
+              <a:t>The project entitled as</a:t>
+            </a:r>
+            <a:r>
+              <a:rPr lang="en-US" sz="2300" b="1" dirty="0">
+                <a:effectLst/>
+                <a:latin typeface="Times New Roman" panose="02020603050405020304" pitchFamily="18" charset="0"/>
+                <a:ea typeface="Times New Roman" panose="02020603050405020304" pitchFamily="18" charset="0"/>
+                <a:cs typeface="Times New Roman" panose="02020603050405020304" pitchFamily="18" charset="0"/>
+              </a:rPr>
+              <a:t> College Management System</a:t>
+            </a:r>
+            <a:r>
+              <a:rPr lang="en-US" sz="2300" dirty="0">
+                <a:effectLst/>
+                <a:latin typeface="Times New Roman" panose="02020603050405020304" pitchFamily="18" charset="0"/>
+                <a:ea typeface="Times New Roman" panose="02020603050405020304" pitchFamily="18" charset="0"/>
+                <a:cs typeface="Times New Roman" panose="02020603050405020304" pitchFamily="18" charset="0"/>
+              </a:rPr>
+              <a:t> is the system that deals with the issues related to a particular institution.</a:t>
+            </a:r>
+          </a:p>
+          <a:p>
+            <a:pPr algn="just">
+              <a:lnSpc>
+                <a:spcPct val="150000"/>
+              </a:lnSpc>
+              <a:spcAft>
+                <a:spcPts val="1000"/>
+              </a:spcAft>
+            </a:pPr>
+            <a:r>
+              <a:rPr lang="en-US" sz="2300" dirty="0">
+                <a:effectLst/>
+                <a:latin typeface="Times New Roman" panose="02020603050405020304" pitchFamily="18" charset="0"/>
+                <a:ea typeface="Times New Roman" panose="02020603050405020304" pitchFamily="18" charset="0"/>
+                <a:cs typeface="Times New Roman" panose="02020603050405020304" pitchFamily="18" charset="0"/>
+              </a:rPr>
+              <a:t>This project is successfully implemented with all the features mentioned in system requirements specification.</a:t>
+            </a:r>
+            <a:endParaRPr lang="en-IN" sz="2300" dirty="0">
               <a:effectLst/>
-              <a:latin typeface="Arial" panose="020B0604020202020204" pitchFamily="34" charset="0"/>
+              <a:latin typeface="Calibri" panose="020F0502020204030204" pitchFamily="34" charset="0"/>
+              <a:ea typeface="Times New Roman" panose="02020603050405020304" pitchFamily="18" charset="0"/>
+              <a:cs typeface="Times New Roman" panose="02020603050405020304" pitchFamily="18" charset="0"/>
             </a:endParaRPr>
           </a:p>
           <a:p>
-            <a:pPr marL="0" indent="0">
-              <a:buNone/>
+            <a:pPr algn="just">
+              <a:lnSpc>
+                <a:spcPct val="150000"/>
+              </a:lnSpc>
+              <a:spcAft>
+                <a:spcPts val="1000"/>
+              </a:spcAft>
+              <a:tabLst>
+                <a:tab pos="457200" algn="l"/>
+              </a:tabLst>
             </a:pPr>
             <a:r>
-              <a:rPr lang="en-US" sz="5600" b="0" i="0" dirty="0">
-                <a:solidFill>
-                  <a:srgbClr val="000000"/>
-                </a:solidFill>
+              <a:rPr lang="en-US" sz="2300" dirty="0">
                 <a:effectLst/>
-                <a:latin typeface="Arial" panose="020B0604020202020204" pitchFamily="34" charset="0"/>
+                <a:latin typeface="Times New Roman" panose="02020603050405020304" pitchFamily="18" charset="0"/>
+                <a:ea typeface="Times New Roman" panose="02020603050405020304" pitchFamily="18" charset="0"/>
+                <a:cs typeface="Times New Roman" panose="02020603050405020304" pitchFamily="18" charset="0"/>
               </a:rPr>
-              <a:t>…..</a:t>
-            </a:r>
-          </a:p>
-          <a:p>
-            <a:pPr marL="0" indent="0">
-              <a:buNone/>
+              <a:t>The project is designed keeping in view the day to day problems faced by a college.</a:t>
+            </a:r>
+            <a:endParaRPr lang="en-IN" sz="2300" dirty="0">
+              <a:effectLst/>
+              <a:latin typeface="Calibri" panose="020F0502020204030204" pitchFamily="34" charset="0"/>
+              <a:ea typeface="Times New Roman" panose="02020603050405020304" pitchFamily="18" charset="0"/>
+              <a:cs typeface="Times New Roman" panose="02020603050405020304" pitchFamily="18" charset="0"/>
+            </a:endParaRPr>
+          </a:p>
+          <a:p>
+            <a:pPr algn="just">
+              <a:lnSpc>
+                <a:spcPct val="150000"/>
+              </a:lnSpc>
+              <a:spcAft>
+                <a:spcPts val="1000"/>
+              </a:spcAft>
+              <a:tabLst>
+                <a:tab pos="457200" algn="l"/>
+              </a:tabLst>
             </a:pPr>
             <a:r>
-              <a:rPr lang="en-US" sz="5600" b="0" i="0" dirty="0">
-                <a:solidFill>
-                  <a:srgbClr val="000000"/>
-                </a:solidFill>
+              <a:rPr lang="en-US" sz="2300" dirty="0">
                 <a:effectLst/>
-                <a:latin typeface="Arial" panose="020B0604020202020204" pitchFamily="34" charset="0"/>
+                <a:latin typeface="Times New Roman" panose="02020603050405020304" pitchFamily="18" charset="0"/>
+                <a:ea typeface="Times New Roman" panose="02020603050405020304" pitchFamily="18" charset="0"/>
+                <a:cs typeface="Times New Roman" panose="02020603050405020304" pitchFamily="18" charset="0"/>
               </a:rPr>
-              <a:t>}</a:t>
-            </a:r>
-          </a:p>
-          <a:p>
-            <a:pPr marL="0" indent="0">
-              <a:buNone/>
+              <a:t>Deployment of our application will certainly help the college to reduce unnecessary wastage of time in personally going to each department for some information.</a:t>
+            </a:r>
+            <a:endParaRPr lang="en-IN" sz="2300" dirty="0">
+              <a:effectLst/>
+              <a:latin typeface="Calibri" panose="020F0502020204030204" pitchFamily="34" charset="0"/>
+              <a:ea typeface="Times New Roman" panose="02020603050405020304" pitchFamily="18" charset="0"/>
+              <a:cs typeface="Times New Roman" panose="02020603050405020304" pitchFamily="18" charset="0"/>
+            </a:endParaRPr>
+          </a:p>
+          <a:p>
+            <a:pPr algn="just">
+              <a:lnSpc>
+                <a:spcPct val="150000"/>
+              </a:lnSpc>
+              <a:spcAft>
+                <a:spcPts val="1000"/>
+              </a:spcAft>
             </a:pPr>
-            <a:endParaRPr lang="en-US" sz="5600" b="0" i="0" dirty="0">
-              <a:solidFill>
-                <a:srgbClr val="000000"/>
-              </a:solidFill>
+            <a:r>
+              <a:rPr lang="en-US" sz="2300" b="1" dirty="0">
+                <a:effectLst/>
+                <a:latin typeface="Times New Roman" panose="02020603050405020304" pitchFamily="18" charset="0"/>
+                <a:ea typeface="Times New Roman" panose="02020603050405020304" pitchFamily="18" charset="0"/>
+                <a:cs typeface="Times New Roman" panose="02020603050405020304" pitchFamily="18" charset="0"/>
+              </a:rPr>
+              <a:t> </a:t>
+            </a:r>
+            <a:r>
+              <a:rPr lang="en-US" sz="2300" dirty="0">
+                <a:effectLst/>
+                <a:latin typeface="Times New Roman" panose="02020603050405020304" pitchFamily="18" charset="0"/>
+                <a:ea typeface="Times New Roman" panose="02020603050405020304" pitchFamily="18" charset="0"/>
+                <a:cs typeface="Times New Roman" panose="02020603050405020304" pitchFamily="18" charset="0"/>
+              </a:rPr>
+              <a:t>Awareness and right information about any college is essential for both the development of student as well as faculty. So this serves the right purpose in achieving the desired requirements of both the communities</a:t>
+            </a:r>
+            <a:r>
+              <a:rPr lang="en-US" sz="2300" u="sng" dirty="0">
+                <a:effectLst/>
+                <a:latin typeface="Times New Roman" panose="02020603050405020304" pitchFamily="18" charset="0"/>
+                <a:ea typeface="Times New Roman" panose="02020603050405020304" pitchFamily="18" charset="0"/>
+                <a:cs typeface="Times New Roman" panose="02020603050405020304" pitchFamily="18" charset="0"/>
+              </a:rPr>
+              <a:t>.</a:t>
+            </a:r>
+            <a:endParaRPr lang="en-IN" sz="2300" dirty="0">
               <a:effectLst/>
-              <a:latin typeface="Arial" panose="020B0604020202020204" pitchFamily="34" charset="0"/>
+              <a:latin typeface="Calibri" panose="020F0502020204030204" pitchFamily="34" charset="0"/>
+              <a:ea typeface="Times New Roman" panose="02020603050405020304" pitchFamily="18" charset="0"/>
+              <a:cs typeface="Times New Roman" panose="02020603050405020304" pitchFamily="18" charset="0"/>
             </a:endParaRPr>
           </a:p>
           <a:p>
-            <a:pPr marL="0" indent="0">
-              <a:buNone/>
-            </a:pPr>
-            <a:endParaRPr lang="en-US" b="0" i="0" dirty="0">
-              <a:solidFill>
-                <a:srgbClr val="000000"/>
-              </a:solidFill>
-              <a:effectLst/>
-              <a:latin typeface="Arial" panose="020B0604020202020204" pitchFamily="34" charset="0"/>
-            </a:endParaRPr>
-          </a:p>
-          <a:p>
-            <a:pPr marL="0" indent="0">
-              <a:buNone/>
-            </a:pPr>
-            <a:endParaRPr lang="en-US" dirty="0">
-              <a:solidFill>
-                <a:srgbClr val="000000"/>
-              </a:solidFill>
-              <a:latin typeface="Arial" panose="020B0604020202020204" pitchFamily="34" charset="0"/>
-            </a:endParaRPr>
-          </a:p>
-          <a:p>
-            <a:pPr marL="0" indent="0">
-              <a:buNone/>
-            </a:pPr>
-            <a:r>
-              <a:rPr lang="en-US" b="0" i="0" dirty="0">
-                <a:solidFill>
-                  <a:srgbClr val="000000"/>
-                </a:solidFill>
-                <a:effectLst/>
-                <a:latin typeface="Arial" panose="020B0604020202020204" pitchFamily="34" charset="0"/>
-              </a:rPr>
-              <a:t>   </a:t>
-            </a:r>
-          </a:p>
-          <a:p>
-            <a:pPr marL="0" indent="0">
-              <a:buNone/>
-            </a:pPr>
-            <a:r>
-              <a:rPr lang="en-US" dirty="0">
-                <a:solidFill>
-                  <a:srgbClr val="000000"/>
-                </a:solidFill>
-                <a:latin typeface="Arial" panose="020B0604020202020204" pitchFamily="34" charset="0"/>
-              </a:rPr>
-              <a:t>      </a:t>
-            </a:r>
             <a:endParaRPr lang="en-IN" dirty="0"/>
-          </a:p>
-        </p:txBody>
-      </p:sp>
-      <p:sp>
-        <p:nvSpPr>
-          <p:cNvPr id="9" name="Rectangle 6">
-            <a:extLst>
-              <a:ext uri="{FF2B5EF4-FFF2-40B4-BE49-F238E27FC236}">
-                <a16:creationId xmlns:a16="http://schemas.microsoft.com/office/drawing/2014/main" id="{F5DA5CBF-EFBE-A770-9CAB-0D36CC420523}"/>
-              </a:ext>
-            </a:extLst>
-          </p:cNvPr>
-          <p:cNvSpPr>
-            <a:spLocks noChangeArrowheads="1"/>
-          </p:cNvSpPr>
-          <p:nvPr/>
-        </p:nvSpPr>
-        <p:spPr bwMode="auto">
-          <a:xfrm>
-            <a:off x="0" y="43934"/>
-            <a:ext cx="184731" cy="369332"/>
-          </a:xfrm>
-          <a:prstGeom prst="rect">
-            <a:avLst/>
-          </a:prstGeom>
-          <a:solidFill>
-            <a:srgbClr val="FFFFFF"/>
-          </a:solidFill>
-          <a:ln>
-            <a:noFill/>
-          </a:ln>
-          <a:effectLst/>
-          <a:extLst>
-            <a:ext uri="{91240B29-F687-4F45-9708-019B960494DF}">
-              <a14:hiddenLine xmlns:a14="http://schemas.microsoft.com/office/drawing/2010/main" w="9525">
-                <a:solidFill>
-                  <a:schemeClr val="tx1"/>
-                </a:solidFill>
-                <a:miter lim="800000"/>
-                <a:headEnd/>
-                <a:tailEnd/>
-              </a14:hiddenLine>
-            </a:ext>
-            <a:ext uri="{AF507438-7753-43E0-B8FC-AC1667EBCBE1}">
-              <a14:hiddenEffects xmlns:a14="http://schemas.microsoft.com/office/drawing/2010/main">
-                <a:effectLst>
-                  <a:outerShdw dist="35921" dir="2700000" algn="ctr" rotWithShape="0">
-                    <a:schemeClr val="bg2"/>
-                  </a:outerShdw>
-                </a:effectLst>
-              </a14:hiddenEffects>
-            </a:ext>
-          </a:extLst>
-        </p:spPr>
-        <p:txBody>
-          <a:bodyPr vert="horz" wrap="none" lIns="91440" tIns="45720" rIns="91440" bIns="45720" numCol="1" anchor="ctr" anchorCtr="0" compatLnSpc="1">
-            <a:prstTxWarp prst="textNoShape">
-              <a:avLst/>
-            </a:prstTxWarp>
-            <a:spAutoFit/>
-          </a:bodyPr>
-          <a:lstStyle/>
-          <a:p>
-            <a:pPr marL="0" marR="0" lvl="0" indent="0" algn="l" defTabSz="914400" rtl="0" eaLnBrk="0" fontAlgn="base" latinLnBrk="0" hangingPunct="0">
-              <a:lnSpc>
-                <a:spcPct val="100000"/>
-              </a:lnSpc>
-              <a:spcBef>
-                <a:spcPct val="0"/>
-              </a:spcBef>
-              <a:spcAft>
-                <a:spcPct val="0"/>
-              </a:spcAft>
-              <a:buClrTx/>
-              <a:buSzTx/>
-              <a:buFontTx/>
-              <a:buNone/>
-              <a:tabLst/>
-            </a:pPr>
-            <a:endParaRPr kumimoji="0" lang="en-US" altLang="en-US" sz="1800" b="0" i="0" u="none" strike="noStrike" cap="none" normalizeH="0" baseline="0" dirty="0">
-              <a:ln>
-                <a:noFill/>
-              </a:ln>
-              <a:solidFill>
-                <a:schemeClr val="tx1"/>
-              </a:solidFill>
-              <a:effectLst/>
-              <a:latin typeface="Arial" panose="020B0604020202020204" pitchFamily="34" charset="0"/>
-            </a:endParaRPr>
           </a:p>
         </p:txBody>
       </p:sp>
     </p:spTree>
     <p:extLst>
       <p:ext uri="{BB962C8B-B14F-4D97-AF65-F5344CB8AC3E}">
-        <p14:creationId xmlns:p14="http://schemas.microsoft.com/office/powerpoint/2010/main" val="2233725024"/>
+        <p14:creationId xmlns:p14="http://schemas.microsoft.com/office/powerpoint/2010/main" val="1537919190"/>
       </p:ext>
     </p:extLst>
   </p:cSld>

</xml_diff>